<commit_message>
1.1.0 using FileStorage 2.1.1
</commit_message>
<xml_diff>
--- a/doc/images.pptx
+++ b/doc/images.pptx
@@ -8,6 +8,7 @@
     <p:sldId id="256" r:id="rId2"/>
     <p:sldId id="257" r:id="rId3"/>
     <p:sldId id="258" r:id="rId4"/>
+    <p:sldId id="259" r:id="rId5"/>
   </p:sldIdLst>
   <p:sldSz cx="12192000" cy="6858000"/>
   <p:notesSz cx="6858000" cy="9144000"/>
@@ -261,7 +262,7 @@
           <a:p>
             <a:fld id="{27C5939A-5517-4BD5-8EC4-A9D53E5E1772}" type="datetimeFigureOut">
               <a:rPr lang="en-US" smtClean="0"/>
-              <a:t>8/8/2024</a:t>
+              <a:t>9/22/2025</a:t>
             </a:fld>
             <a:endParaRPr lang="en-US"/>
           </a:p>
@@ -459,7 +460,7 @@
           <a:p>
             <a:fld id="{27C5939A-5517-4BD5-8EC4-A9D53E5E1772}" type="datetimeFigureOut">
               <a:rPr lang="en-US" smtClean="0"/>
-              <a:t>8/8/2024</a:t>
+              <a:t>9/22/2025</a:t>
             </a:fld>
             <a:endParaRPr lang="en-US"/>
           </a:p>
@@ -667,7 +668,7 @@
           <a:p>
             <a:fld id="{27C5939A-5517-4BD5-8EC4-A9D53E5E1772}" type="datetimeFigureOut">
               <a:rPr lang="en-US" smtClean="0"/>
-              <a:t>8/8/2024</a:t>
+              <a:t>9/22/2025</a:t>
             </a:fld>
             <a:endParaRPr lang="en-US"/>
           </a:p>
@@ -865,7 +866,7 @@
           <a:p>
             <a:fld id="{27C5939A-5517-4BD5-8EC4-A9D53E5E1772}" type="datetimeFigureOut">
               <a:rPr lang="en-US" smtClean="0"/>
-              <a:t>8/8/2024</a:t>
+              <a:t>9/22/2025</a:t>
             </a:fld>
             <a:endParaRPr lang="en-US"/>
           </a:p>
@@ -1140,7 +1141,7 @@
           <a:p>
             <a:fld id="{27C5939A-5517-4BD5-8EC4-A9D53E5E1772}" type="datetimeFigureOut">
               <a:rPr lang="en-US" smtClean="0"/>
-              <a:t>8/8/2024</a:t>
+              <a:t>9/22/2025</a:t>
             </a:fld>
             <a:endParaRPr lang="en-US"/>
           </a:p>
@@ -1405,7 +1406,7 @@
           <a:p>
             <a:fld id="{27C5939A-5517-4BD5-8EC4-A9D53E5E1772}" type="datetimeFigureOut">
               <a:rPr lang="en-US" smtClean="0"/>
-              <a:t>8/8/2024</a:t>
+              <a:t>9/22/2025</a:t>
             </a:fld>
             <a:endParaRPr lang="en-US"/>
           </a:p>
@@ -1817,7 +1818,7 @@
           <a:p>
             <a:fld id="{27C5939A-5517-4BD5-8EC4-A9D53E5E1772}" type="datetimeFigureOut">
               <a:rPr lang="en-US" smtClean="0"/>
-              <a:t>8/8/2024</a:t>
+              <a:t>9/22/2025</a:t>
             </a:fld>
             <a:endParaRPr lang="en-US"/>
           </a:p>
@@ -1958,7 +1959,7 @@
           <a:p>
             <a:fld id="{27C5939A-5517-4BD5-8EC4-A9D53E5E1772}" type="datetimeFigureOut">
               <a:rPr lang="en-US" smtClean="0"/>
-              <a:t>8/8/2024</a:t>
+              <a:t>9/22/2025</a:t>
             </a:fld>
             <a:endParaRPr lang="en-US"/>
           </a:p>
@@ -2071,7 +2072,7 @@
           <a:p>
             <a:fld id="{27C5939A-5517-4BD5-8EC4-A9D53E5E1772}" type="datetimeFigureOut">
               <a:rPr lang="en-US" smtClean="0"/>
-              <a:t>8/8/2024</a:t>
+              <a:t>9/22/2025</a:t>
             </a:fld>
             <a:endParaRPr lang="en-US"/>
           </a:p>
@@ -2382,7 +2383,7 @@
           <a:p>
             <a:fld id="{27C5939A-5517-4BD5-8EC4-A9D53E5E1772}" type="datetimeFigureOut">
               <a:rPr lang="en-US" smtClean="0"/>
-              <a:t>8/8/2024</a:t>
+              <a:t>9/22/2025</a:t>
             </a:fld>
             <a:endParaRPr lang="en-US"/>
           </a:p>
@@ -2670,7 +2671,7 @@
           <a:p>
             <a:fld id="{27C5939A-5517-4BD5-8EC4-A9D53E5E1772}" type="datetimeFigureOut">
               <a:rPr lang="en-US" smtClean="0"/>
-              <a:t>8/8/2024</a:t>
+              <a:t>9/22/2025</a:t>
             </a:fld>
             <a:endParaRPr lang="en-US"/>
           </a:p>
@@ -2911,7 +2912,7 @@
           <a:p>
             <a:fld id="{27C5939A-5517-4BD5-8EC4-A9D53E5E1772}" type="datetimeFigureOut">
               <a:rPr lang="en-US" smtClean="0"/>
-              <a:t>8/8/2024</a:t>
+              <a:t>9/22/2025</a:t>
             </a:fld>
             <a:endParaRPr lang="en-US"/>
           </a:p>
@@ -3342,8 +3343,8 @@
         </p:nvSpPr>
         <p:spPr>
           <a:xfrm>
-            <a:off x="196807" y="2094790"/>
-            <a:ext cx="2143792" cy="1477328"/>
+            <a:off x="110793" y="1333462"/>
+            <a:ext cx="2143792" cy="2031325"/>
           </a:xfrm>
           <a:prstGeom prst="rect">
             <a:avLst/>
@@ -3364,6 +3365,20 @@
               <a:rPr lang="en-US" dirty="0"/>
               <a:t>Storage definition</a:t>
             </a:r>
+          </a:p>
+          <a:p>
+            <a:pPr marL="285750" indent="-285750">
+              <a:buFont typeface="Arial" panose="020B0604020202020204" pitchFamily="34" charset="0"/>
+              <a:buChar char="•"/>
+            </a:pPr>
+            <a:endParaRPr lang="en-US" dirty="0"/>
+          </a:p>
+          <a:p>
+            <a:pPr marL="285750" indent="-285750">
+              <a:buFont typeface="Arial" panose="020B0604020202020204" pitchFamily="34" charset="0"/>
+              <a:buChar char="•"/>
+            </a:pPr>
+            <a:endParaRPr lang="en-US" dirty="0"/>
           </a:p>
           <a:p>
             <a:pPr marL="285750" indent="-285750">
@@ -3451,7 +3466,30 @@
             <a:pPr algn="ctr"/>
             <a:r>
               <a:rPr lang="en-US" dirty="0"/>
-              <a:t>File storage</a:t>
+              <a:t>Connector</a:t>
+            </a:r>
+          </a:p>
+          <a:p>
+            <a:pPr algn="ctr"/>
+            <a:endParaRPr lang="en-US" dirty="0"/>
+          </a:p>
+          <a:p>
+            <a:pPr algn="ctr"/>
+            <a:endParaRPr lang="en-US" dirty="0"/>
+          </a:p>
+          <a:p>
+            <a:pPr algn="ctr"/>
+            <a:endParaRPr lang="en-US" dirty="0"/>
+          </a:p>
+          <a:p>
+            <a:pPr algn="ctr"/>
+            <a:endParaRPr lang="en-US" dirty="0"/>
+          </a:p>
+          <a:p>
+            <a:pPr algn="ctr"/>
+            <a:r>
+              <a:rPr lang="en-US" dirty="0"/>
+              <a:t>storage</a:t>
             </a:r>
           </a:p>
         </p:txBody>
@@ -3568,7 +3606,7 @@
         </p:nvSpPr>
         <p:spPr>
           <a:xfrm>
-            <a:off x="1182689" y="2453735"/>
+            <a:off x="1241103" y="2260875"/>
             <a:ext cx="403733" cy="481353"/>
           </a:xfrm>
           <a:prstGeom prst="foldedCorner">
@@ -3803,7 +3841,7 @@
         <p:spPr>
           <a:xfrm>
             <a:off x="2119086" y="6440711"/>
-            <a:ext cx="7341946" cy="369332"/>
+            <a:ext cx="9456307" cy="369332"/>
           </a:xfrm>
           <a:prstGeom prst="rect">
             <a:avLst/>
@@ -3818,7 +3856,7 @@
           <a:p>
             <a:r>
               <a:rPr lang="en-US" dirty="0"/>
-              <a:t>     CMIS		JSON		Folder		Temporary folder</a:t>
+              <a:t>     CMIS		JSON		Folder		Temporary folder             Camunda 8 Doc</a:t>
             </a:r>
           </a:p>
         </p:txBody>
@@ -3979,6 +4017,36 @@
               </a14:hiddenFill>
             </a:ext>
           </a:extLst>
+        </p:spPr>
+      </p:pic>
+      <p:pic>
+        <p:nvPicPr>
+          <p:cNvPr id="13" name="Picture 12">
+            <a:extLst>
+              <a:ext uri="{FF2B5EF4-FFF2-40B4-BE49-F238E27FC236}">
+                <a16:creationId xmlns:a16="http://schemas.microsoft.com/office/drawing/2014/main" id="{3F0C134B-F590-769A-7584-963E5C950043}"/>
+              </a:ext>
+            </a:extLst>
+          </p:cNvPr>
+          <p:cNvPicPr>
+            <a:picLocks noChangeAspect="1"/>
+          </p:cNvPicPr>
+          <p:nvPr/>
+        </p:nvPicPr>
+        <p:blipFill>
+          <a:blip r:embed="rId6"/>
+          <a:stretch>
+            <a:fillRect/>
+          </a:stretch>
+        </p:blipFill>
+        <p:spPr>
+          <a:xfrm>
+            <a:off x="10078742" y="5599202"/>
+            <a:ext cx="1018095" cy="342725"/>
+          </a:xfrm>
+          <a:prstGeom prst="rect">
+            <a:avLst/>
+          </a:prstGeom>
         </p:spPr>
       </p:pic>
     </p:spTree>
@@ -4013,10 +4081,10 @@
       </p:grpSpPr>
       <p:sp>
         <p:nvSpPr>
-          <p:cNvPr id="4" name="Rectangle 3">
-            <a:extLst>
-              <a:ext uri="{FF2B5EF4-FFF2-40B4-BE49-F238E27FC236}">
-                <a16:creationId xmlns:a16="http://schemas.microsoft.com/office/drawing/2014/main" id="{50BD0FF2-14C0-B769-4A9B-8342386C3B83}"/>
+          <p:cNvPr id="8" name="Rectangle 7">
+            <a:extLst>
+              <a:ext uri="{FF2B5EF4-FFF2-40B4-BE49-F238E27FC236}">
+                <a16:creationId xmlns:a16="http://schemas.microsoft.com/office/drawing/2014/main" id="{04103266-9C82-B892-0379-C81794D8B79B}"/>
               </a:ext>
             </a:extLst>
           </p:cNvPr>
@@ -4025,12 +4093,18 @@
         </p:nvSpPr>
         <p:spPr>
           <a:xfrm>
-            <a:off x="1654629" y="3614304"/>
-            <a:ext cx="9329381" cy="1084881"/>
+            <a:off x="1669775" y="2916272"/>
+            <a:ext cx="9680707" cy="1935314"/>
           </a:xfrm>
           <a:prstGeom prst="rect">
             <a:avLst/>
           </a:prstGeom>
+          <a:solidFill>
+            <a:schemeClr val="accent6">
+              <a:lumMod val="60000"/>
+              <a:lumOff val="40000"/>
+            </a:schemeClr>
+          </a:solidFill>
         </p:spPr>
         <p:style>
           <a:lnRef idx="2">
@@ -4055,17 +4129,37 @@
             <a:pPr algn="ctr"/>
             <a:r>
               <a:rPr lang="en-US" dirty="0"/>
-              <a:t>File storage</a:t>
-            </a:r>
-          </a:p>
-        </p:txBody>
-      </p:sp>
-      <p:sp>
-        <p:nvSpPr>
-          <p:cNvPr id="6" name="Rectangle: Folded Corner 5">
-            <a:extLst>
-              <a:ext uri="{FF2B5EF4-FFF2-40B4-BE49-F238E27FC236}">
-                <a16:creationId xmlns:a16="http://schemas.microsoft.com/office/drawing/2014/main" id="{6ED70ECE-5B8D-8A8F-54C1-EF39E0C062AC}"/>
+              <a:t>Connector</a:t>
+            </a:r>
+          </a:p>
+          <a:p>
+            <a:pPr algn="ctr"/>
+            <a:endParaRPr lang="en-US" dirty="0"/>
+          </a:p>
+          <a:p>
+            <a:pPr algn="ctr"/>
+            <a:endParaRPr lang="en-US" dirty="0"/>
+          </a:p>
+          <a:p>
+            <a:pPr algn="ctr"/>
+            <a:endParaRPr lang="en-US" dirty="0"/>
+          </a:p>
+          <a:p>
+            <a:pPr algn="ctr"/>
+            <a:endParaRPr lang="en-US" dirty="0"/>
+          </a:p>
+          <a:p>
+            <a:pPr algn="ctr"/>
+            <a:endParaRPr lang="en-US" dirty="0"/>
+          </a:p>
+        </p:txBody>
+      </p:sp>
+      <p:sp>
+        <p:nvSpPr>
+          <p:cNvPr id="4" name="Rectangle 3">
+            <a:extLst>
+              <a:ext uri="{FF2B5EF4-FFF2-40B4-BE49-F238E27FC236}">
+                <a16:creationId xmlns:a16="http://schemas.microsoft.com/office/drawing/2014/main" id="{50BD0FF2-14C0-B769-4A9B-8342386C3B83}"/>
               </a:ext>
             </a:extLst>
           </p:cNvPr>
@@ -4074,18 +4168,12 @@
         </p:nvSpPr>
         <p:spPr>
           <a:xfrm>
-            <a:off x="4840514" y="2640032"/>
-            <a:ext cx="537029" cy="638628"/>
-          </a:xfrm>
-          <a:prstGeom prst="foldedCorner">
-            <a:avLst/>
-          </a:prstGeom>
-          <a:solidFill>
-            <a:schemeClr val="accent2">
-              <a:lumMod val="60000"/>
-              <a:lumOff val="40000"/>
-            </a:schemeClr>
-          </a:solidFill>
+            <a:off x="1967949" y="3614304"/>
+            <a:ext cx="9016061" cy="1084881"/>
+          </a:xfrm>
+          <a:prstGeom prst="rect">
+            <a:avLst/>
+          </a:prstGeom>
         </p:spPr>
         <p:style>
           <a:lnRef idx="2">
@@ -4108,7 +4196,10 @@
           <a:lstStyle/>
           <a:p>
             <a:pPr algn="ctr"/>
-            <a:endParaRPr lang="en-US"/>
+            <a:r>
+              <a:rPr lang="en-US" dirty="0"/>
+              <a:t>File storage</a:t>
+            </a:r>
           </a:p>
         </p:txBody>
       </p:sp>
@@ -4128,8 +4219,8 @@
         </p:nvCxnSpPr>
         <p:spPr>
           <a:xfrm>
-            <a:off x="2423886" y="1996035"/>
-            <a:ext cx="0" cy="1618269"/>
+            <a:off x="457200" y="3910185"/>
+            <a:ext cx="1212575" cy="0"/>
           </a:xfrm>
           <a:prstGeom prst="straightConnector1">
             <a:avLst/>
@@ -4200,47 +4291,6 @@
           </a:extLst>
         </p:spPr>
       </p:pic>
-      <p:cxnSp>
-        <p:nvCxnSpPr>
-          <p:cNvPr id="15" name="Straight Arrow Connector 14">
-            <a:extLst>
-              <a:ext uri="{FF2B5EF4-FFF2-40B4-BE49-F238E27FC236}">
-                <a16:creationId xmlns:a16="http://schemas.microsoft.com/office/drawing/2014/main" id="{E18937E8-5D5F-B329-4661-44671BC7793F}"/>
-              </a:ext>
-            </a:extLst>
-          </p:cNvPr>
-          <p:cNvCxnSpPr>
-            <a:cxnSpLocks/>
-          </p:cNvCxnSpPr>
-          <p:nvPr/>
-        </p:nvCxnSpPr>
-        <p:spPr>
-          <a:xfrm flipV="1">
-            <a:off x="4572000" y="2551004"/>
-            <a:ext cx="0" cy="1063300"/>
-          </a:xfrm>
-          <a:prstGeom prst="straightConnector1">
-            <a:avLst/>
-          </a:prstGeom>
-          <a:ln w="38100">
-            <a:tailEnd type="triangle"/>
-          </a:ln>
-        </p:spPr>
-        <p:style>
-          <a:lnRef idx="1">
-            <a:schemeClr val="accent1"/>
-          </a:lnRef>
-          <a:fillRef idx="0">
-            <a:schemeClr val="accent1"/>
-          </a:fillRef>
-          <a:effectRef idx="0">
-            <a:schemeClr val="accent1"/>
-          </a:effectRef>
-          <a:fontRef idx="minor">
-            <a:schemeClr val="tx1"/>
-          </a:fontRef>
-        </p:style>
-      </p:cxnSp>
       <p:sp>
         <p:nvSpPr>
           <p:cNvPr id="20" name="TextBox 19">
@@ -4255,8 +4305,8 @@
         </p:nvSpPr>
         <p:spPr>
           <a:xfrm>
-            <a:off x="2528277" y="2197279"/>
-            <a:ext cx="1506695" cy="369332"/>
+            <a:off x="169334" y="3090063"/>
+            <a:ext cx="1506695" cy="646331"/>
           </a:xfrm>
           <a:prstGeom prst="rect">
             <a:avLst/>
@@ -4274,6 +4324,12 @@
               <a:t>File Reference</a:t>
             </a:r>
           </a:p>
+          <a:p>
+            <a:r>
+              <a:rPr lang="en-US" dirty="0"/>
+              <a:t>Folder</a:t>
+            </a:r>
+          </a:p>
         </p:txBody>
       </p:sp>
       <p:sp>
@@ -4290,7 +4346,7 @@
         </p:nvSpPr>
         <p:spPr>
           <a:xfrm>
-            <a:off x="4746173" y="2197279"/>
+            <a:off x="4777630" y="1753536"/>
             <a:ext cx="511679" cy="369332"/>
           </a:xfrm>
           <a:prstGeom prst="rect">
@@ -4360,7 +4416,7 @@
         </p:nvSpPr>
         <p:spPr>
           <a:xfrm>
-            <a:off x="2423886" y="5442857"/>
+            <a:off x="1207987" y="5442857"/>
             <a:ext cx="711200" cy="551543"/>
           </a:xfrm>
           <a:prstGeom prst="can">
@@ -4424,7 +4480,7 @@
         </p:blipFill>
         <p:spPr bwMode="auto">
           <a:xfrm flipV="1">
-            <a:off x="3856324" y="5346126"/>
+            <a:off x="2640425" y="5346126"/>
             <a:ext cx="711201" cy="711201"/>
           </a:xfrm>
           <a:prstGeom prst="rect">
@@ -4471,7 +4527,7 @@
         </p:blipFill>
         <p:spPr bwMode="auto">
           <a:xfrm>
-            <a:off x="5624287" y="5208235"/>
+            <a:off x="4381895" y="5208235"/>
             <a:ext cx="943426" cy="943426"/>
           </a:xfrm>
           <a:prstGeom prst="rect">
@@ -4518,7 +4574,7 @@
         </p:blipFill>
         <p:spPr bwMode="auto">
           <a:xfrm>
-            <a:off x="7902528" y="5145496"/>
+            <a:off x="6660136" y="5145496"/>
             <a:ext cx="1084882" cy="1084882"/>
           </a:xfrm>
           <a:prstGeom prst="rect">
@@ -4550,8 +4606,8 @@
         </p:nvSpPr>
         <p:spPr>
           <a:xfrm>
-            <a:off x="2119086" y="6440711"/>
-            <a:ext cx="8864927" cy="369332"/>
+            <a:off x="922682" y="6344061"/>
+            <a:ext cx="10346635" cy="369332"/>
           </a:xfrm>
           <a:prstGeom prst="rect">
             <a:avLst/>
@@ -4559,18 +4615,141 @@
           <a:noFill/>
         </p:spPr>
         <p:txBody>
-          <a:bodyPr wrap="none" rtlCol="0">
+          <a:bodyPr wrap="square" rtlCol="0">
             <a:spAutoFit/>
           </a:bodyPr>
           <a:lstStyle/>
           <a:p>
             <a:r>
               <a:rPr lang="en-US" dirty="0"/>
-              <a:t>     CMIS		JSON		Folder		Temporary folder		URL</a:t>
-            </a:r>
-          </a:p>
-        </p:txBody>
-      </p:sp>
+              <a:t>     CMIS		JSON		Folder		Temporary folder	 Camunda 8 Doc          URL</a:t>
+            </a:r>
+          </a:p>
+        </p:txBody>
+      </p:sp>
+      <p:pic>
+        <p:nvPicPr>
+          <p:cNvPr id="5" name="Picture 4">
+            <a:extLst>
+              <a:ext uri="{FF2B5EF4-FFF2-40B4-BE49-F238E27FC236}">
+                <a16:creationId xmlns:a16="http://schemas.microsoft.com/office/drawing/2014/main" id="{2678EB3E-C516-D591-C18E-95461C02205A}"/>
+              </a:ext>
+            </a:extLst>
+          </p:cNvPr>
+          <p:cNvPicPr>
+            <a:picLocks noChangeAspect="1"/>
+          </p:cNvPicPr>
+          <p:nvPr/>
+        </p:nvPicPr>
+        <p:blipFill>
+          <a:blip r:embed="rId6"/>
+          <a:stretch>
+            <a:fillRect/>
+          </a:stretch>
+        </p:blipFill>
+        <p:spPr>
+          <a:xfrm>
+            <a:off x="8336858" y="5547265"/>
+            <a:ext cx="1018095" cy="342725"/>
+          </a:xfrm>
+          <a:prstGeom prst="rect">
+            <a:avLst/>
+          </a:prstGeom>
+        </p:spPr>
+      </p:pic>
+      <p:sp>
+        <p:nvSpPr>
+          <p:cNvPr id="18" name="Rectangle: Folded Corner 17">
+            <a:extLst>
+              <a:ext uri="{FF2B5EF4-FFF2-40B4-BE49-F238E27FC236}">
+                <a16:creationId xmlns:a16="http://schemas.microsoft.com/office/drawing/2014/main" id="{4027A38E-ED7A-BBAB-F555-115883CCCBC7}"/>
+              </a:ext>
+            </a:extLst>
+          </p:cNvPr>
+          <p:cNvSpPr/>
+          <p:nvPr/>
+        </p:nvSpPr>
+        <p:spPr>
+          <a:xfrm>
+            <a:off x="4921588" y="2207883"/>
+            <a:ext cx="403733" cy="481353"/>
+          </a:xfrm>
+          <a:prstGeom prst="foldedCorner">
+            <a:avLst/>
+          </a:prstGeom>
+          <a:solidFill>
+            <a:schemeClr val="accent2">
+              <a:lumMod val="60000"/>
+              <a:lumOff val="40000"/>
+            </a:schemeClr>
+          </a:solidFill>
+        </p:spPr>
+        <p:style>
+          <a:lnRef idx="2">
+            <a:schemeClr val="accent1">
+              <a:shade val="15000"/>
+            </a:schemeClr>
+          </a:lnRef>
+          <a:fillRef idx="1">
+            <a:schemeClr val="accent1"/>
+          </a:fillRef>
+          <a:effectRef idx="0">
+            <a:schemeClr val="accent1"/>
+          </a:effectRef>
+          <a:fontRef idx="minor">
+            <a:schemeClr val="lt1"/>
+          </a:fontRef>
+        </p:style>
+        <p:txBody>
+          <a:bodyPr rtlCol="0" anchor="ctr"/>
+          <a:lstStyle/>
+          <a:p>
+            <a:pPr algn="ctr"/>
+            <a:endParaRPr lang="en-US"/>
+          </a:p>
+        </p:txBody>
+      </p:sp>
+      <p:cxnSp>
+        <p:nvCxnSpPr>
+          <p:cNvPr id="19" name="Straight Arrow Connector 18">
+            <a:extLst>
+              <a:ext uri="{FF2B5EF4-FFF2-40B4-BE49-F238E27FC236}">
+                <a16:creationId xmlns:a16="http://schemas.microsoft.com/office/drawing/2014/main" id="{F8996053-F631-2103-B21B-968744180653}"/>
+              </a:ext>
+            </a:extLst>
+          </p:cNvPr>
+          <p:cNvCxnSpPr>
+            <a:cxnSpLocks/>
+          </p:cNvCxnSpPr>
+          <p:nvPr/>
+        </p:nvCxnSpPr>
+        <p:spPr>
+          <a:xfrm flipV="1">
+            <a:off x="4651513" y="2097157"/>
+            <a:ext cx="0" cy="819115"/>
+          </a:xfrm>
+          <a:prstGeom prst="straightConnector1">
+            <a:avLst/>
+          </a:prstGeom>
+          <a:ln w="38100">
+            <a:tailEnd type="triangle"/>
+          </a:ln>
+        </p:spPr>
+        <p:style>
+          <a:lnRef idx="1">
+            <a:schemeClr val="accent1"/>
+          </a:lnRef>
+          <a:fillRef idx="0">
+            <a:schemeClr val="accent1"/>
+          </a:fillRef>
+          <a:effectRef idx="0">
+            <a:schemeClr val="accent1"/>
+          </a:effectRef>
+          <a:fontRef idx="minor">
+            <a:schemeClr val="tx1"/>
+          </a:fontRef>
+        </p:style>
+      </p:cxnSp>
     </p:spTree>
     <p:extLst>
       <p:ext uri="{BB962C8B-B14F-4D97-AF65-F5344CB8AC3E}">
@@ -4603,10 +4782,10 @@
       </p:grpSpPr>
       <p:sp>
         <p:nvSpPr>
-          <p:cNvPr id="4" name="Rectangle 3">
-            <a:extLst>
-              <a:ext uri="{FF2B5EF4-FFF2-40B4-BE49-F238E27FC236}">
-                <a16:creationId xmlns:a16="http://schemas.microsoft.com/office/drawing/2014/main" id="{50BD0FF2-14C0-B769-4A9B-8342386C3B83}"/>
+          <p:cNvPr id="2" name="Rectangle 1">
+            <a:extLst>
+              <a:ext uri="{FF2B5EF4-FFF2-40B4-BE49-F238E27FC236}">
+                <a16:creationId xmlns:a16="http://schemas.microsoft.com/office/drawing/2014/main" id="{8ECA315D-14BF-1FF0-DF31-204B99B6CF10}"/>
               </a:ext>
             </a:extLst>
           </p:cNvPr>
@@ -4615,12 +4794,18 @@
         </p:nvSpPr>
         <p:spPr>
           <a:xfrm>
-            <a:off x="1654629" y="3614304"/>
-            <a:ext cx="9158509" cy="1084881"/>
+            <a:off x="1378863" y="2916272"/>
+            <a:ext cx="9971620" cy="1935314"/>
           </a:xfrm>
           <a:prstGeom prst="rect">
             <a:avLst/>
           </a:prstGeom>
+          <a:solidFill>
+            <a:schemeClr val="accent6">
+              <a:lumMod val="60000"/>
+              <a:lumOff val="40000"/>
+            </a:schemeClr>
+          </a:solidFill>
         </p:spPr>
         <p:style>
           <a:lnRef idx="2">
@@ -4645,175 +4830,37 @@
             <a:pPr algn="ctr"/>
             <a:r>
               <a:rPr lang="en-US" dirty="0"/>
-              <a:t>File storage</a:t>
-            </a:r>
-          </a:p>
-        </p:txBody>
-      </p:sp>
-      <p:cxnSp>
-        <p:nvCxnSpPr>
-          <p:cNvPr id="10" name="Straight Arrow Connector 9">
-            <a:extLst>
-              <a:ext uri="{FF2B5EF4-FFF2-40B4-BE49-F238E27FC236}">
-                <a16:creationId xmlns:a16="http://schemas.microsoft.com/office/drawing/2014/main" id="{9DDDE992-1C60-E352-BB2C-56F4FADAE985}"/>
-              </a:ext>
-            </a:extLst>
-          </p:cNvPr>
-          <p:cNvCxnSpPr>
-            <a:cxnSpLocks/>
-          </p:cNvCxnSpPr>
-          <p:nvPr/>
-        </p:nvCxnSpPr>
-        <p:spPr>
-          <a:xfrm>
-            <a:off x="2423886" y="1996035"/>
-            <a:ext cx="0" cy="1618269"/>
-          </a:xfrm>
-          <a:prstGeom prst="straightConnector1">
-            <a:avLst/>
-          </a:prstGeom>
-          <a:ln w="38100">
-            <a:tailEnd type="triangle"/>
-          </a:ln>
-        </p:spPr>
-        <p:style>
-          <a:lnRef idx="1">
-            <a:schemeClr val="accent1"/>
-          </a:lnRef>
-          <a:fillRef idx="0">
-            <a:schemeClr val="accent1"/>
-          </a:fillRef>
-          <a:effectRef idx="0">
-            <a:schemeClr val="accent1"/>
-          </a:effectRef>
-          <a:fontRef idx="minor">
-            <a:schemeClr val="tx1"/>
-          </a:fontRef>
-        </p:style>
-      </p:cxnSp>
-      <p:sp>
-        <p:nvSpPr>
-          <p:cNvPr id="20" name="TextBox 19">
-            <a:extLst>
-              <a:ext uri="{FF2B5EF4-FFF2-40B4-BE49-F238E27FC236}">
-                <a16:creationId xmlns:a16="http://schemas.microsoft.com/office/drawing/2014/main" id="{96606B8C-7471-4670-BC2F-5D74357675CE}"/>
-              </a:ext>
-            </a:extLst>
-          </p:cNvPr>
-          <p:cNvSpPr txBox="1"/>
-          <p:nvPr/>
-        </p:nvSpPr>
-        <p:spPr>
-          <a:xfrm>
-            <a:off x="2528277" y="2197279"/>
-            <a:ext cx="1506695" cy="369332"/>
-          </a:xfrm>
-          <a:prstGeom prst="rect">
-            <a:avLst/>
-          </a:prstGeom>
-          <a:noFill/>
-        </p:spPr>
-        <p:txBody>
-          <a:bodyPr wrap="none" rtlCol="0">
-            <a:spAutoFit/>
-          </a:bodyPr>
-          <a:lstStyle/>
-          <a:p>
-            <a:r>
-              <a:rPr lang="en-US" dirty="0"/>
-              <a:t>File Reference</a:t>
-            </a:r>
-          </a:p>
-        </p:txBody>
-      </p:sp>
-      <p:sp>
-        <p:nvSpPr>
-          <p:cNvPr id="3" name="TextBox 2">
-            <a:extLst>
-              <a:ext uri="{FF2B5EF4-FFF2-40B4-BE49-F238E27FC236}">
-                <a16:creationId xmlns:a16="http://schemas.microsoft.com/office/drawing/2014/main" id="{186FAF21-AAF6-2794-6877-CEDD574F3324}"/>
-              </a:ext>
-            </a:extLst>
-          </p:cNvPr>
-          <p:cNvSpPr txBox="1"/>
-          <p:nvPr/>
-        </p:nvSpPr>
-        <p:spPr>
-          <a:xfrm>
-            <a:off x="4211925" y="787401"/>
-            <a:ext cx="2667462" cy="707886"/>
-          </a:xfrm>
-          <a:prstGeom prst="rect">
-            <a:avLst/>
-          </a:prstGeom>
-          <a:noFill/>
-        </p:spPr>
-        <p:txBody>
-          <a:bodyPr wrap="none" rtlCol="0">
-            <a:spAutoFit/>
-          </a:bodyPr>
-          <a:lstStyle/>
-          <a:p>
-            <a:r>
-              <a:rPr lang="en-US" sz="4000" dirty="0"/>
-              <a:t>Delete a file</a:t>
-            </a:r>
-          </a:p>
-        </p:txBody>
-      </p:sp>
-      <p:pic>
-        <p:nvPicPr>
-          <p:cNvPr id="7" name="Picture 8" descr="Free Link Url vector and picture">
-            <a:extLst>
-              <a:ext uri="{FF2B5EF4-FFF2-40B4-BE49-F238E27FC236}">
-                <a16:creationId xmlns:a16="http://schemas.microsoft.com/office/drawing/2014/main" id="{D881FE4A-294B-329A-CB07-24475DB1D306}"/>
-              </a:ext>
-            </a:extLst>
-          </p:cNvPr>
-          <p:cNvPicPr>
-            <a:picLocks noChangeAspect="1" noChangeArrowheads="1"/>
-          </p:cNvPicPr>
-          <p:nvPr/>
-        </p:nvPicPr>
-        <p:blipFill>
-          <a:blip r:embed="rId2">
-            <a:extLst>
-              <a:ext uri="{28A0092B-C50C-407E-A947-70E740481C1C}">
-                <a14:useLocalDpi xmlns:a14="http://schemas.microsoft.com/office/drawing/2010/main" val="0"/>
-              </a:ext>
-            </a:extLst>
-          </a:blip>
-          <a:srcRect/>
-          <a:stretch>
-            <a:fillRect/>
-          </a:stretch>
-        </p:blipFill>
-        <p:spPr bwMode="auto">
-          <a:xfrm>
-            <a:off x="10160021" y="5346126"/>
-            <a:ext cx="823992" cy="823992"/>
-          </a:xfrm>
-          <a:prstGeom prst="rect">
-            <a:avLst/>
-          </a:prstGeom>
-          <a:noFill/>
-          <a:extLst>
-            <a:ext uri="{909E8E84-426E-40DD-AFC4-6F175D3DCCD1}">
-              <a14:hiddenFill xmlns:a14="http://schemas.microsoft.com/office/drawing/2010/main">
-                <a:solidFill>
-                  <a:srgbClr val="FFFFFF"/>
-                </a:solidFill>
-              </a14:hiddenFill>
-            </a:ext>
-          </a:extLst>
-        </p:spPr>
-      </p:pic>
-      <p:sp>
-        <p:nvSpPr>
-          <p:cNvPr id="8" name="Cylinder 7">
-            <a:extLst>
-              <a:ext uri="{FF2B5EF4-FFF2-40B4-BE49-F238E27FC236}">
-                <a16:creationId xmlns:a16="http://schemas.microsoft.com/office/drawing/2014/main" id="{B932200F-2D47-06F6-0141-CAB7369F47B1}"/>
+              <a:t>Connector</a:t>
+            </a:r>
+          </a:p>
+          <a:p>
+            <a:pPr algn="ctr"/>
+            <a:endParaRPr lang="en-US" dirty="0"/>
+          </a:p>
+          <a:p>
+            <a:pPr algn="ctr"/>
+            <a:endParaRPr lang="en-US" dirty="0"/>
+          </a:p>
+          <a:p>
+            <a:pPr algn="ctr"/>
+            <a:endParaRPr lang="en-US" dirty="0"/>
+          </a:p>
+          <a:p>
+            <a:pPr algn="ctr"/>
+            <a:endParaRPr lang="en-US" dirty="0"/>
+          </a:p>
+          <a:p>
+            <a:pPr algn="ctr"/>
+            <a:endParaRPr lang="en-US" dirty="0"/>
+          </a:p>
+        </p:txBody>
+      </p:sp>
+      <p:sp>
+        <p:nvSpPr>
+          <p:cNvPr id="4" name="Rectangle 3">
+            <a:extLst>
+              <a:ext uri="{FF2B5EF4-FFF2-40B4-BE49-F238E27FC236}">
+                <a16:creationId xmlns:a16="http://schemas.microsoft.com/office/drawing/2014/main" id="{50BD0FF2-14C0-B769-4A9B-8342386C3B83}"/>
               </a:ext>
             </a:extLst>
           </p:cNvPr>
@@ -4822,10 +4869,10 @@
         </p:nvSpPr>
         <p:spPr>
           <a:xfrm>
-            <a:off x="2423886" y="5442857"/>
-            <a:ext cx="711200" cy="551543"/>
-          </a:xfrm>
-          <a:prstGeom prst="can">
+            <a:off x="1654629" y="3614304"/>
+            <a:ext cx="9158509" cy="1084881"/>
+          </a:xfrm>
+          <a:prstGeom prst="rect">
             <a:avLst/>
           </a:prstGeom>
         </p:spPr>
@@ -4851,6 +4898,166 @@
           <a:p>
             <a:pPr algn="ctr"/>
             <a:r>
+              <a:rPr lang="en-US" dirty="0"/>
+              <a:t>File storage</a:t>
+            </a:r>
+          </a:p>
+        </p:txBody>
+      </p:sp>
+      <p:cxnSp>
+        <p:nvCxnSpPr>
+          <p:cNvPr id="10" name="Straight Arrow Connector 9">
+            <a:extLst>
+              <a:ext uri="{FF2B5EF4-FFF2-40B4-BE49-F238E27FC236}">
+                <a16:creationId xmlns:a16="http://schemas.microsoft.com/office/drawing/2014/main" id="{9DDDE992-1C60-E352-BB2C-56F4FADAE985}"/>
+              </a:ext>
+            </a:extLst>
+          </p:cNvPr>
+          <p:cNvCxnSpPr>
+            <a:cxnSpLocks/>
+          </p:cNvCxnSpPr>
+          <p:nvPr/>
+        </p:nvCxnSpPr>
+        <p:spPr>
+          <a:xfrm>
+            <a:off x="387626" y="3916018"/>
+            <a:ext cx="991237" cy="0"/>
+          </a:xfrm>
+          <a:prstGeom prst="straightConnector1">
+            <a:avLst/>
+          </a:prstGeom>
+          <a:ln w="38100">
+            <a:tailEnd type="triangle"/>
+          </a:ln>
+        </p:spPr>
+        <p:style>
+          <a:lnRef idx="1">
+            <a:schemeClr val="accent1"/>
+          </a:lnRef>
+          <a:fillRef idx="0">
+            <a:schemeClr val="accent1"/>
+          </a:fillRef>
+          <a:effectRef idx="0">
+            <a:schemeClr val="accent1"/>
+          </a:effectRef>
+          <a:fontRef idx="minor">
+            <a:schemeClr val="tx1"/>
+          </a:fontRef>
+        </p:style>
+      </p:cxnSp>
+      <p:sp>
+        <p:nvSpPr>
+          <p:cNvPr id="20" name="TextBox 19">
+            <a:extLst>
+              <a:ext uri="{FF2B5EF4-FFF2-40B4-BE49-F238E27FC236}">
+                <a16:creationId xmlns:a16="http://schemas.microsoft.com/office/drawing/2014/main" id="{96606B8C-7471-4670-BC2F-5D74357675CE}"/>
+              </a:ext>
+            </a:extLst>
+          </p:cNvPr>
+          <p:cNvSpPr txBox="1"/>
+          <p:nvPr/>
+        </p:nvSpPr>
+        <p:spPr>
+          <a:xfrm>
+            <a:off x="-64110" y="3429638"/>
+            <a:ext cx="1506695" cy="369332"/>
+          </a:xfrm>
+          <a:prstGeom prst="rect">
+            <a:avLst/>
+          </a:prstGeom>
+          <a:noFill/>
+        </p:spPr>
+        <p:txBody>
+          <a:bodyPr wrap="none" rtlCol="0">
+            <a:spAutoFit/>
+          </a:bodyPr>
+          <a:lstStyle/>
+          <a:p>
+            <a:r>
+              <a:rPr lang="en-US" dirty="0"/>
+              <a:t>File Reference</a:t>
+            </a:r>
+          </a:p>
+        </p:txBody>
+      </p:sp>
+      <p:sp>
+        <p:nvSpPr>
+          <p:cNvPr id="3" name="TextBox 2">
+            <a:extLst>
+              <a:ext uri="{FF2B5EF4-FFF2-40B4-BE49-F238E27FC236}">
+                <a16:creationId xmlns:a16="http://schemas.microsoft.com/office/drawing/2014/main" id="{186FAF21-AAF6-2794-6877-CEDD574F3324}"/>
+              </a:ext>
+            </a:extLst>
+          </p:cNvPr>
+          <p:cNvSpPr txBox="1"/>
+          <p:nvPr/>
+        </p:nvSpPr>
+        <p:spPr>
+          <a:xfrm>
+            <a:off x="4211925" y="787401"/>
+            <a:ext cx="2667462" cy="707886"/>
+          </a:xfrm>
+          <a:prstGeom prst="rect">
+            <a:avLst/>
+          </a:prstGeom>
+          <a:noFill/>
+        </p:spPr>
+        <p:txBody>
+          <a:bodyPr wrap="none" rtlCol="0">
+            <a:spAutoFit/>
+          </a:bodyPr>
+          <a:lstStyle/>
+          <a:p>
+            <a:r>
+              <a:rPr lang="en-US" sz="4000" dirty="0"/>
+              <a:t>Delete a file</a:t>
+            </a:r>
+          </a:p>
+        </p:txBody>
+      </p:sp>
+      <p:sp>
+        <p:nvSpPr>
+          <p:cNvPr id="5" name="Cylinder 4">
+            <a:extLst>
+              <a:ext uri="{FF2B5EF4-FFF2-40B4-BE49-F238E27FC236}">
+                <a16:creationId xmlns:a16="http://schemas.microsoft.com/office/drawing/2014/main" id="{2F7E8FAE-BE57-0E5B-27BD-FBECC912BBAD}"/>
+              </a:ext>
+            </a:extLst>
+          </p:cNvPr>
+          <p:cNvSpPr/>
+          <p:nvPr/>
+        </p:nvSpPr>
+        <p:spPr>
+          <a:xfrm>
+            <a:off x="1181494" y="5442857"/>
+            <a:ext cx="711200" cy="551543"/>
+          </a:xfrm>
+          <a:prstGeom prst="can">
+            <a:avLst/>
+          </a:prstGeom>
+        </p:spPr>
+        <p:style>
+          <a:lnRef idx="2">
+            <a:schemeClr val="accent1">
+              <a:shade val="15000"/>
+            </a:schemeClr>
+          </a:lnRef>
+          <a:fillRef idx="1">
+            <a:schemeClr val="accent1"/>
+          </a:fillRef>
+          <a:effectRef idx="0">
+            <a:schemeClr val="accent1"/>
+          </a:effectRef>
+          <a:fontRef idx="minor">
+            <a:schemeClr val="lt1"/>
+          </a:fontRef>
+        </p:style>
+        <p:txBody>
+          <a:bodyPr rtlCol="0" anchor="ctr"/>
+          <a:lstStyle/>
+          <a:p>
+            <a:pPr algn="ctr"/>
+            <a:r>
               <a:rPr lang="en-US" sz="1200" dirty="0"/>
               <a:t>CMIS</a:t>
             </a:r>
@@ -4859,10 +5066,10 @@
       </p:sp>
       <p:pic>
         <p:nvPicPr>
-          <p:cNvPr id="9" name="Picture 2" descr="json Vector Icons free download in SVG, PNG Format">
-            <a:extLst>
-              <a:ext uri="{FF2B5EF4-FFF2-40B4-BE49-F238E27FC236}">
-                <a16:creationId xmlns:a16="http://schemas.microsoft.com/office/drawing/2014/main" id="{7D488628-DDBC-C9F1-9894-8280A88E7514}"/>
+          <p:cNvPr id="6" name="Picture 2" descr="json Vector Icons free download in SVG, PNG Format">
+            <a:extLst>
+              <a:ext uri="{FF2B5EF4-FFF2-40B4-BE49-F238E27FC236}">
+                <a16:creationId xmlns:a16="http://schemas.microsoft.com/office/drawing/2014/main" id="{365C93E0-F343-E8D3-ACFB-BF96186EEEFF}"/>
               </a:ext>
             </a:extLst>
           </p:cNvPr>
@@ -4872,7 +5079,7 @@
           <p:nvPr/>
         </p:nvPicPr>
         <p:blipFill>
-          <a:blip r:embed="rId3">
+          <a:blip r:embed="rId2">
             <a:extLst>
               <a:ext uri="{28A0092B-C50C-407E-A947-70E740481C1C}">
                 <a14:useLocalDpi xmlns:a14="http://schemas.microsoft.com/office/drawing/2010/main" val="0"/>
@@ -4886,7 +5093,7 @@
         </p:blipFill>
         <p:spPr bwMode="auto">
           <a:xfrm flipV="1">
-            <a:off x="3856324" y="5346126"/>
+            <a:off x="2613932" y="5346126"/>
             <a:ext cx="711201" cy="711201"/>
           </a:xfrm>
           <a:prstGeom prst="rect">
@@ -4906,10 +5113,10 @@
       </p:pic>
       <p:pic>
         <p:nvPicPr>
-          <p:cNvPr id="11" name="Picture 4" descr="Free Folder SVG, PNG Icon, Symbol. Download Image.">
-            <a:extLst>
-              <a:ext uri="{FF2B5EF4-FFF2-40B4-BE49-F238E27FC236}">
-                <a16:creationId xmlns:a16="http://schemas.microsoft.com/office/drawing/2014/main" id="{580F4BDC-1D3F-2CE6-A522-61DB193F78C1}"/>
+          <p:cNvPr id="12" name="Picture 4" descr="Free Folder SVG, PNG Icon, Symbol. Download Image.">
+            <a:extLst>
+              <a:ext uri="{FF2B5EF4-FFF2-40B4-BE49-F238E27FC236}">
+                <a16:creationId xmlns:a16="http://schemas.microsoft.com/office/drawing/2014/main" id="{D8BD6F08-3474-F07C-2E68-62FF022B9410}"/>
               </a:ext>
             </a:extLst>
           </p:cNvPr>
@@ -4919,7 +5126,7 @@
           <p:nvPr/>
         </p:nvPicPr>
         <p:blipFill>
-          <a:blip r:embed="rId4">
+          <a:blip r:embed="rId3">
             <a:extLst>
               <a:ext uri="{28A0092B-C50C-407E-A947-70E740481C1C}">
                 <a14:useLocalDpi xmlns:a14="http://schemas.microsoft.com/office/drawing/2010/main" val="0"/>
@@ -4933,7 +5140,7 @@
         </p:blipFill>
         <p:spPr bwMode="auto">
           <a:xfrm>
-            <a:off x="5624287" y="5208235"/>
+            <a:off x="4381895" y="5208235"/>
             <a:ext cx="943426" cy="943426"/>
           </a:xfrm>
           <a:prstGeom prst="rect">
@@ -4953,10 +5160,10 @@
       </p:pic>
       <p:pic>
         <p:nvPicPr>
-          <p:cNvPr id="13" name="Picture 6" descr="Folder Dossier Temps SZ icon">
-            <a:extLst>
-              <a:ext uri="{FF2B5EF4-FFF2-40B4-BE49-F238E27FC236}">
-                <a16:creationId xmlns:a16="http://schemas.microsoft.com/office/drawing/2014/main" id="{32394103-C800-5780-76DC-35C654571FF7}"/>
+          <p:cNvPr id="15" name="Picture 6" descr="Folder Dossier Temps SZ icon">
+            <a:extLst>
+              <a:ext uri="{FF2B5EF4-FFF2-40B4-BE49-F238E27FC236}">
+                <a16:creationId xmlns:a16="http://schemas.microsoft.com/office/drawing/2014/main" id="{05C5A3CD-A309-F977-2D53-DECD35E93991}"/>
               </a:ext>
             </a:extLst>
           </p:cNvPr>
@@ -4966,7 +5173,7 @@
           <p:nvPr/>
         </p:nvPicPr>
         <p:blipFill>
-          <a:blip r:embed="rId5">
+          <a:blip r:embed="rId4">
             <a:extLst>
               <a:ext uri="{28A0092B-C50C-407E-A947-70E740481C1C}">
                 <a14:useLocalDpi xmlns:a14="http://schemas.microsoft.com/office/drawing/2010/main" val="0"/>
@@ -4980,7 +5187,7 @@
         </p:blipFill>
         <p:spPr bwMode="auto">
           <a:xfrm>
-            <a:off x="7902528" y="5145496"/>
+            <a:off x="6660136" y="5145496"/>
             <a:ext cx="1084882" cy="1084882"/>
           </a:xfrm>
           <a:prstGeom prst="rect">
@@ -5000,10 +5207,10 @@
       </p:pic>
       <p:sp>
         <p:nvSpPr>
-          <p:cNvPr id="14" name="TextBox 13">
-            <a:extLst>
-              <a:ext uri="{FF2B5EF4-FFF2-40B4-BE49-F238E27FC236}">
-                <a16:creationId xmlns:a16="http://schemas.microsoft.com/office/drawing/2014/main" id="{934B998F-563B-BE8F-D8CD-5E7F19980285}"/>
+          <p:cNvPr id="16" name="TextBox 15">
+            <a:extLst>
+              <a:ext uri="{FF2B5EF4-FFF2-40B4-BE49-F238E27FC236}">
+                <a16:creationId xmlns:a16="http://schemas.microsoft.com/office/drawing/2014/main" id="{4F03D8EF-64DE-8A93-2E64-FCC2969DEB26}"/>
               </a:ext>
             </a:extLst>
           </p:cNvPr>
@@ -5012,8 +5219,8 @@
         </p:nvSpPr>
         <p:spPr>
           <a:xfrm>
-            <a:off x="2119086" y="6440711"/>
-            <a:ext cx="8864927" cy="369332"/>
+            <a:off x="922682" y="6344060"/>
+            <a:ext cx="9354379" cy="369332"/>
           </a:xfrm>
           <a:prstGeom prst="rect">
             <a:avLst/>
@@ -5021,22 +5228,993 @@
           <a:noFill/>
         </p:spPr>
         <p:txBody>
-          <a:bodyPr wrap="none" rtlCol="0">
+          <a:bodyPr wrap="square" rtlCol="0">
             <a:spAutoFit/>
           </a:bodyPr>
           <a:lstStyle/>
           <a:p>
             <a:r>
               <a:rPr lang="en-US" dirty="0"/>
-              <a:t>     CMIS		JSON		Folder		Temporary folder		URL</a:t>
-            </a:r>
-          </a:p>
-        </p:txBody>
-      </p:sp>
+              <a:t>     CMIS		JSON		Folder		Temporary folder	 Camunda 8 Doc</a:t>
+            </a:r>
+          </a:p>
+        </p:txBody>
+      </p:sp>
+      <p:pic>
+        <p:nvPicPr>
+          <p:cNvPr id="17" name="Picture 16">
+            <a:extLst>
+              <a:ext uri="{FF2B5EF4-FFF2-40B4-BE49-F238E27FC236}">
+                <a16:creationId xmlns:a16="http://schemas.microsoft.com/office/drawing/2014/main" id="{6B6FB22A-D5BA-5EF5-2B75-6B0B7091D9E5}"/>
+              </a:ext>
+            </a:extLst>
+          </p:cNvPr>
+          <p:cNvPicPr>
+            <a:picLocks noChangeAspect="1"/>
+          </p:cNvPicPr>
+          <p:nvPr/>
+        </p:nvPicPr>
+        <p:blipFill>
+          <a:blip r:embed="rId5"/>
+          <a:stretch>
+            <a:fillRect/>
+          </a:stretch>
+        </p:blipFill>
+        <p:spPr>
+          <a:xfrm>
+            <a:off x="8336858" y="5547265"/>
+            <a:ext cx="1018095" cy="342725"/>
+          </a:xfrm>
+          <a:prstGeom prst="rect">
+            <a:avLst/>
+          </a:prstGeom>
+        </p:spPr>
+      </p:pic>
     </p:spTree>
     <p:extLst>
       <p:ext uri="{BB962C8B-B14F-4D97-AF65-F5344CB8AC3E}">
         <p14:creationId xmlns:p14="http://schemas.microsoft.com/office/powerpoint/2010/main" val="2921029532"/>
+      </p:ext>
+    </p:extLst>
+  </p:cSld>
+  <p:clrMapOvr>
+    <a:masterClrMapping/>
+  </p:clrMapOvr>
+</p:sld>
+</file>
+
+<file path=ppt/slides/slide4.xml><?xml version="1.0" encoding="utf-8"?>
+<p:sld xmlns:a="http://schemas.openxmlformats.org/drawingml/2006/main" xmlns:r="http://schemas.openxmlformats.org/officeDocument/2006/relationships" xmlns:p="http://schemas.openxmlformats.org/presentationml/2006/main">
+  <p:cSld>
+    <p:spTree>
+      <p:nvGrpSpPr>
+        <p:cNvPr id="1" name="">
+          <a:extLst>
+            <a:ext uri="{FF2B5EF4-FFF2-40B4-BE49-F238E27FC236}">
+              <a16:creationId xmlns:a16="http://schemas.microsoft.com/office/drawing/2014/main" id="{553B7FE3-D463-86F2-3AD2-1E4813EB4C54}"/>
+            </a:ext>
+          </a:extLst>
+        </p:cNvPr>
+        <p:cNvGrpSpPr/>
+        <p:nvPr/>
+      </p:nvGrpSpPr>
+      <p:grpSpPr>
+        <a:xfrm>
+          <a:off x="0" y="0"/>
+          <a:ext cx="0" cy="0"/>
+          <a:chOff x="0" y="0"/>
+          <a:chExt cx="0" cy="0"/>
+        </a:xfrm>
+      </p:grpSpPr>
+      <p:sp>
+        <p:nvSpPr>
+          <p:cNvPr id="7" name="Rectangle 6">
+            <a:extLst>
+              <a:ext uri="{FF2B5EF4-FFF2-40B4-BE49-F238E27FC236}">
+                <a16:creationId xmlns:a16="http://schemas.microsoft.com/office/drawing/2014/main" id="{08A4B796-A285-2F61-EEF1-8696D1A0BD54}"/>
+              </a:ext>
+            </a:extLst>
+          </p:cNvPr>
+          <p:cNvSpPr/>
+          <p:nvPr/>
+        </p:nvSpPr>
+        <p:spPr>
+          <a:xfrm>
+            <a:off x="2248971" y="3079476"/>
+            <a:ext cx="8087725" cy="2467579"/>
+          </a:xfrm>
+          <a:prstGeom prst="rect">
+            <a:avLst/>
+          </a:prstGeom>
+          <a:solidFill>
+            <a:schemeClr val="accent6">
+              <a:lumMod val="60000"/>
+              <a:lumOff val="40000"/>
+            </a:schemeClr>
+          </a:solidFill>
+        </p:spPr>
+        <p:style>
+          <a:lnRef idx="2">
+            <a:schemeClr val="accent1">
+              <a:shade val="15000"/>
+            </a:schemeClr>
+          </a:lnRef>
+          <a:fillRef idx="1">
+            <a:schemeClr val="accent1"/>
+          </a:fillRef>
+          <a:effectRef idx="0">
+            <a:schemeClr val="accent1"/>
+          </a:effectRef>
+          <a:fontRef idx="minor">
+            <a:schemeClr val="lt1"/>
+          </a:fontRef>
+        </p:style>
+        <p:txBody>
+          <a:bodyPr rtlCol="0" anchor="ctr"/>
+          <a:lstStyle/>
+          <a:p>
+            <a:pPr algn="ctr"/>
+            <a:r>
+              <a:rPr lang="en-US" dirty="0"/>
+              <a:t>File storage</a:t>
+            </a:r>
+          </a:p>
+        </p:txBody>
+      </p:sp>
+      <p:sp>
+        <p:nvSpPr>
+          <p:cNvPr id="4" name="Rectangle 3">
+            <a:extLst>
+              <a:ext uri="{FF2B5EF4-FFF2-40B4-BE49-F238E27FC236}">
+                <a16:creationId xmlns:a16="http://schemas.microsoft.com/office/drawing/2014/main" id="{223C70C3-672A-7EFA-7AE5-71C84D8569DF}"/>
+              </a:ext>
+            </a:extLst>
+          </p:cNvPr>
+          <p:cNvSpPr/>
+          <p:nvPr/>
+        </p:nvSpPr>
+        <p:spPr>
+          <a:xfrm>
+            <a:off x="2423885" y="4615502"/>
+            <a:ext cx="7814773" cy="677759"/>
+          </a:xfrm>
+          <a:prstGeom prst="rect">
+            <a:avLst/>
+          </a:prstGeom>
+        </p:spPr>
+        <p:style>
+          <a:lnRef idx="2">
+            <a:schemeClr val="accent1">
+              <a:shade val="15000"/>
+            </a:schemeClr>
+          </a:lnRef>
+          <a:fillRef idx="1">
+            <a:schemeClr val="accent1"/>
+          </a:fillRef>
+          <a:effectRef idx="0">
+            <a:schemeClr val="accent1"/>
+          </a:effectRef>
+          <a:fontRef idx="minor">
+            <a:schemeClr val="lt1"/>
+          </a:fontRef>
+        </p:style>
+        <p:txBody>
+          <a:bodyPr rtlCol="0" anchor="ctr"/>
+          <a:lstStyle/>
+          <a:p>
+            <a:pPr algn="ctr"/>
+            <a:r>
+              <a:rPr lang="en-US" dirty="0"/>
+              <a:t>Destination File storage</a:t>
+            </a:r>
+          </a:p>
+        </p:txBody>
+      </p:sp>
+      <p:sp>
+        <p:nvSpPr>
+          <p:cNvPr id="5" name="Cylinder 4">
+            <a:extLst>
+              <a:ext uri="{FF2B5EF4-FFF2-40B4-BE49-F238E27FC236}">
+                <a16:creationId xmlns:a16="http://schemas.microsoft.com/office/drawing/2014/main" id="{1335178B-BEC4-C1D7-5FFD-B6AE53E76A08}"/>
+              </a:ext>
+            </a:extLst>
+          </p:cNvPr>
+          <p:cNvSpPr/>
+          <p:nvPr/>
+        </p:nvSpPr>
+        <p:spPr>
+          <a:xfrm>
+            <a:off x="2423886" y="5807760"/>
+            <a:ext cx="711200" cy="551543"/>
+          </a:xfrm>
+          <a:prstGeom prst="can">
+            <a:avLst/>
+          </a:prstGeom>
+        </p:spPr>
+        <p:style>
+          <a:lnRef idx="2">
+            <a:schemeClr val="accent1">
+              <a:shade val="15000"/>
+            </a:schemeClr>
+          </a:lnRef>
+          <a:fillRef idx="1">
+            <a:schemeClr val="accent1"/>
+          </a:fillRef>
+          <a:effectRef idx="0">
+            <a:schemeClr val="accent1"/>
+          </a:effectRef>
+          <a:fontRef idx="minor">
+            <a:schemeClr val="lt1"/>
+          </a:fontRef>
+        </p:style>
+        <p:txBody>
+          <a:bodyPr rtlCol="0" anchor="ctr"/>
+          <a:lstStyle/>
+          <a:p>
+            <a:pPr algn="ctr"/>
+            <a:r>
+              <a:rPr lang="en-US" sz="1200" dirty="0"/>
+              <a:t>CMIS</a:t>
+            </a:r>
+          </a:p>
+        </p:txBody>
+      </p:sp>
+      <p:cxnSp>
+        <p:nvCxnSpPr>
+          <p:cNvPr id="10" name="Straight Arrow Connector 9">
+            <a:extLst>
+              <a:ext uri="{FF2B5EF4-FFF2-40B4-BE49-F238E27FC236}">
+                <a16:creationId xmlns:a16="http://schemas.microsoft.com/office/drawing/2014/main" id="{661B264A-4B12-362C-3D68-494A78151FE1}"/>
+              </a:ext>
+            </a:extLst>
+          </p:cNvPr>
+          <p:cNvCxnSpPr>
+            <a:cxnSpLocks/>
+            <a:endCxn id="7" idx="1"/>
+          </p:cNvCxnSpPr>
+          <p:nvPr/>
+        </p:nvCxnSpPr>
+        <p:spPr>
+          <a:xfrm>
+            <a:off x="248478" y="4313266"/>
+            <a:ext cx="2000493" cy="0"/>
+          </a:xfrm>
+          <a:prstGeom prst="straightConnector1">
+            <a:avLst/>
+          </a:prstGeom>
+          <a:ln w="38100">
+            <a:tailEnd type="triangle"/>
+          </a:ln>
+        </p:spPr>
+        <p:style>
+          <a:lnRef idx="1">
+            <a:schemeClr val="accent1"/>
+          </a:lnRef>
+          <a:fillRef idx="0">
+            <a:schemeClr val="accent1"/>
+          </a:fillRef>
+          <a:effectRef idx="0">
+            <a:schemeClr val="accent1"/>
+          </a:effectRef>
+          <a:fontRef idx="minor">
+            <a:schemeClr val="tx1"/>
+          </a:fontRef>
+        </p:style>
+      </p:cxnSp>
+      <p:pic>
+        <p:nvPicPr>
+          <p:cNvPr id="1026" name="Picture 2" descr="json Vector Icons free download in SVG, PNG Format">
+            <a:extLst>
+              <a:ext uri="{FF2B5EF4-FFF2-40B4-BE49-F238E27FC236}">
+                <a16:creationId xmlns:a16="http://schemas.microsoft.com/office/drawing/2014/main" id="{8B583E72-C5F0-AD3C-995C-08039C48058E}"/>
+              </a:ext>
+            </a:extLst>
+          </p:cNvPr>
+          <p:cNvPicPr>
+            <a:picLocks noChangeAspect="1" noChangeArrowheads="1"/>
+          </p:cNvPicPr>
+          <p:nvPr/>
+        </p:nvPicPr>
+        <p:blipFill>
+          <a:blip r:embed="rId2">
+            <a:extLst>
+              <a:ext uri="{28A0092B-C50C-407E-A947-70E740481C1C}">
+                <a14:useLocalDpi xmlns:a14="http://schemas.microsoft.com/office/drawing/2010/main" val="0"/>
+              </a:ext>
+            </a:extLst>
+          </a:blip>
+          <a:srcRect/>
+          <a:stretch>
+            <a:fillRect/>
+          </a:stretch>
+        </p:blipFill>
+        <p:spPr bwMode="auto">
+          <a:xfrm flipV="1">
+            <a:off x="3856324" y="5711029"/>
+            <a:ext cx="711201" cy="711201"/>
+          </a:xfrm>
+          <a:prstGeom prst="rect">
+            <a:avLst/>
+          </a:prstGeom>
+          <a:noFill/>
+          <a:extLst>
+            <a:ext uri="{909E8E84-426E-40DD-AFC4-6F175D3DCCD1}">
+              <a14:hiddenFill xmlns:a14="http://schemas.microsoft.com/office/drawing/2010/main">
+                <a:solidFill>
+                  <a:srgbClr val="FFFFFF"/>
+                </a:solidFill>
+              </a14:hiddenFill>
+            </a:ext>
+          </a:extLst>
+        </p:spPr>
+      </p:pic>
+      <p:pic>
+        <p:nvPicPr>
+          <p:cNvPr id="1028" name="Picture 4" descr="Free Folder SVG, PNG Icon, Symbol. Download Image.">
+            <a:extLst>
+              <a:ext uri="{FF2B5EF4-FFF2-40B4-BE49-F238E27FC236}">
+                <a16:creationId xmlns:a16="http://schemas.microsoft.com/office/drawing/2014/main" id="{5C27B306-63AD-9A2A-0C65-8A4040639B6F}"/>
+              </a:ext>
+            </a:extLst>
+          </p:cNvPr>
+          <p:cNvPicPr>
+            <a:picLocks noChangeAspect="1" noChangeArrowheads="1"/>
+          </p:cNvPicPr>
+          <p:nvPr/>
+        </p:nvPicPr>
+        <p:blipFill>
+          <a:blip r:embed="rId3">
+            <a:extLst>
+              <a:ext uri="{28A0092B-C50C-407E-A947-70E740481C1C}">
+                <a14:useLocalDpi xmlns:a14="http://schemas.microsoft.com/office/drawing/2010/main" val="0"/>
+              </a:ext>
+            </a:extLst>
+          </a:blip>
+          <a:srcRect/>
+          <a:stretch>
+            <a:fillRect/>
+          </a:stretch>
+        </p:blipFill>
+        <p:spPr bwMode="auto">
+          <a:xfrm>
+            <a:off x="5624287" y="5573138"/>
+            <a:ext cx="943426" cy="943426"/>
+          </a:xfrm>
+          <a:prstGeom prst="rect">
+            <a:avLst/>
+          </a:prstGeom>
+          <a:noFill/>
+          <a:extLst>
+            <a:ext uri="{909E8E84-426E-40DD-AFC4-6F175D3DCCD1}">
+              <a14:hiddenFill xmlns:a14="http://schemas.microsoft.com/office/drawing/2010/main">
+                <a:solidFill>
+                  <a:srgbClr val="FFFFFF"/>
+                </a:solidFill>
+              </a14:hiddenFill>
+            </a:ext>
+          </a:extLst>
+        </p:spPr>
+      </p:pic>
+      <p:pic>
+        <p:nvPicPr>
+          <p:cNvPr id="1030" name="Picture 6" descr="Folder Dossier Temps SZ icon">
+            <a:extLst>
+              <a:ext uri="{FF2B5EF4-FFF2-40B4-BE49-F238E27FC236}">
+                <a16:creationId xmlns:a16="http://schemas.microsoft.com/office/drawing/2014/main" id="{527B48FB-B5C5-CE80-BCAC-1363068CA161}"/>
+              </a:ext>
+            </a:extLst>
+          </p:cNvPr>
+          <p:cNvPicPr>
+            <a:picLocks noChangeAspect="1" noChangeArrowheads="1"/>
+          </p:cNvPicPr>
+          <p:nvPr/>
+        </p:nvPicPr>
+        <p:blipFill>
+          <a:blip r:embed="rId4">
+            <a:extLst>
+              <a:ext uri="{28A0092B-C50C-407E-A947-70E740481C1C}">
+                <a14:useLocalDpi xmlns:a14="http://schemas.microsoft.com/office/drawing/2010/main" val="0"/>
+              </a:ext>
+            </a:extLst>
+          </a:blip>
+          <a:srcRect/>
+          <a:stretch>
+            <a:fillRect/>
+          </a:stretch>
+        </p:blipFill>
+        <p:spPr bwMode="auto">
+          <a:xfrm>
+            <a:off x="7902528" y="5510399"/>
+            <a:ext cx="1084882" cy="1084882"/>
+          </a:xfrm>
+          <a:prstGeom prst="rect">
+            <a:avLst/>
+          </a:prstGeom>
+          <a:noFill/>
+          <a:extLst>
+            <a:ext uri="{909E8E84-426E-40DD-AFC4-6F175D3DCCD1}">
+              <a14:hiddenFill xmlns:a14="http://schemas.microsoft.com/office/drawing/2010/main">
+                <a:solidFill>
+                  <a:srgbClr val="FFFFFF"/>
+                </a:solidFill>
+              </a14:hiddenFill>
+            </a:ext>
+          </a:extLst>
+        </p:spPr>
+      </p:pic>
+      <p:sp>
+        <p:nvSpPr>
+          <p:cNvPr id="12" name="TextBox 11">
+            <a:extLst>
+              <a:ext uri="{FF2B5EF4-FFF2-40B4-BE49-F238E27FC236}">
+                <a16:creationId xmlns:a16="http://schemas.microsoft.com/office/drawing/2014/main" id="{40C45A44-A24C-A9BB-D0A1-1E5B21A9657B}"/>
+              </a:ext>
+            </a:extLst>
+          </p:cNvPr>
+          <p:cNvSpPr txBox="1"/>
+          <p:nvPr/>
+        </p:nvSpPr>
+        <p:spPr>
+          <a:xfrm>
+            <a:off x="2099207" y="6541119"/>
+            <a:ext cx="9456307" cy="369332"/>
+          </a:xfrm>
+          <a:prstGeom prst="rect">
+            <a:avLst/>
+          </a:prstGeom>
+          <a:noFill/>
+        </p:spPr>
+        <p:txBody>
+          <a:bodyPr wrap="none" rtlCol="0">
+            <a:spAutoFit/>
+          </a:bodyPr>
+          <a:lstStyle/>
+          <a:p>
+            <a:r>
+              <a:rPr lang="en-US" dirty="0"/>
+              <a:t>     CMIS		JSON		Folder		Temporary folder             Camunda 8 Doc</a:t>
+            </a:r>
+          </a:p>
+        </p:txBody>
+      </p:sp>
+      <p:cxnSp>
+        <p:nvCxnSpPr>
+          <p:cNvPr id="15" name="Straight Arrow Connector 14">
+            <a:extLst>
+              <a:ext uri="{FF2B5EF4-FFF2-40B4-BE49-F238E27FC236}">
+                <a16:creationId xmlns:a16="http://schemas.microsoft.com/office/drawing/2014/main" id="{0DFE1856-470D-22D9-0340-E94883C8D3D7}"/>
+              </a:ext>
+            </a:extLst>
+          </p:cNvPr>
+          <p:cNvCxnSpPr>
+            <a:cxnSpLocks/>
+            <a:stCxn id="7" idx="3"/>
+          </p:cNvCxnSpPr>
+          <p:nvPr/>
+        </p:nvCxnSpPr>
+        <p:spPr>
+          <a:xfrm flipV="1">
+            <a:off x="10336696" y="4313265"/>
+            <a:ext cx="1303421" cy="1"/>
+          </a:xfrm>
+          <a:prstGeom prst="straightConnector1">
+            <a:avLst/>
+          </a:prstGeom>
+          <a:ln w="38100">
+            <a:tailEnd type="triangle"/>
+          </a:ln>
+        </p:spPr>
+        <p:style>
+          <a:lnRef idx="1">
+            <a:schemeClr val="accent1"/>
+          </a:lnRef>
+          <a:fillRef idx="0">
+            <a:schemeClr val="accent1"/>
+          </a:fillRef>
+          <a:effectRef idx="0">
+            <a:schemeClr val="accent1"/>
+          </a:effectRef>
+          <a:fontRef idx="minor">
+            <a:schemeClr val="tx1"/>
+          </a:fontRef>
+        </p:style>
+      </p:cxnSp>
+      <p:sp>
+        <p:nvSpPr>
+          <p:cNvPr id="20" name="TextBox 19">
+            <a:extLst>
+              <a:ext uri="{FF2B5EF4-FFF2-40B4-BE49-F238E27FC236}">
+                <a16:creationId xmlns:a16="http://schemas.microsoft.com/office/drawing/2014/main" id="{EAC02010-1E9A-5AB6-2EDF-3C13982336AD}"/>
+              </a:ext>
+            </a:extLst>
+          </p:cNvPr>
+          <p:cNvSpPr txBox="1"/>
+          <p:nvPr/>
+        </p:nvSpPr>
+        <p:spPr>
+          <a:xfrm>
+            <a:off x="10300618" y="3894310"/>
+            <a:ext cx="1981825" cy="369332"/>
+          </a:xfrm>
+          <a:prstGeom prst="rect">
+            <a:avLst/>
+          </a:prstGeom>
+          <a:noFill/>
+        </p:spPr>
+        <p:txBody>
+          <a:bodyPr wrap="none" rtlCol="0">
+            <a:spAutoFit/>
+          </a:bodyPr>
+          <a:lstStyle/>
+          <a:p>
+            <a:r>
+              <a:rPr lang="en-US" dirty="0"/>
+              <a:t>Dest File Reference</a:t>
+            </a:r>
+          </a:p>
+        </p:txBody>
+      </p:sp>
+      <p:sp>
+        <p:nvSpPr>
+          <p:cNvPr id="23" name="TextBox 22">
+            <a:extLst>
+              <a:ext uri="{FF2B5EF4-FFF2-40B4-BE49-F238E27FC236}">
+                <a16:creationId xmlns:a16="http://schemas.microsoft.com/office/drawing/2014/main" id="{33B0D9A5-D917-E17A-5578-A9F02C2D208E}"/>
+              </a:ext>
+            </a:extLst>
+          </p:cNvPr>
+          <p:cNvSpPr txBox="1"/>
+          <p:nvPr/>
+        </p:nvSpPr>
+        <p:spPr>
+          <a:xfrm>
+            <a:off x="4211925" y="787401"/>
+            <a:ext cx="2351028" cy="707886"/>
+          </a:xfrm>
+          <a:prstGeom prst="rect">
+            <a:avLst/>
+          </a:prstGeom>
+          <a:noFill/>
+        </p:spPr>
+        <p:txBody>
+          <a:bodyPr wrap="none" rtlCol="0">
+            <a:spAutoFit/>
+          </a:bodyPr>
+          <a:lstStyle/>
+          <a:p>
+            <a:r>
+              <a:rPr lang="en-US" sz="4000" dirty="0"/>
+              <a:t>Copy a file</a:t>
+            </a:r>
+          </a:p>
+        </p:txBody>
+      </p:sp>
+      <p:pic>
+        <p:nvPicPr>
+          <p:cNvPr id="13" name="Picture 12">
+            <a:extLst>
+              <a:ext uri="{FF2B5EF4-FFF2-40B4-BE49-F238E27FC236}">
+                <a16:creationId xmlns:a16="http://schemas.microsoft.com/office/drawing/2014/main" id="{EEFB688A-43CE-570C-504A-CB36EF4FE4FD}"/>
+              </a:ext>
+            </a:extLst>
+          </p:cNvPr>
+          <p:cNvPicPr>
+            <a:picLocks noChangeAspect="1"/>
+          </p:cNvPicPr>
+          <p:nvPr/>
+        </p:nvPicPr>
+        <p:blipFill>
+          <a:blip r:embed="rId5"/>
+          <a:stretch>
+            <a:fillRect/>
+          </a:stretch>
+        </p:blipFill>
+        <p:spPr>
+          <a:xfrm>
+            <a:off x="10078742" y="5964105"/>
+            <a:ext cx="1018095" cy="342725"/>
+          </a:xfrm>
+          <a:prstGeom prst="rect">
+            <a:avLst/>
+          </a:prstGeom>
+        </p:spPr>
+      </p:pic>
+      <p:sp>
+        <p:nvSpPr>
+          <p:cNvPr id="3" name="Rectangle 2">
+            <a:extLst>
+              <a:ext uri="{FF2B5EF4-FFF2-40B4-BE49-F238E27FC236}">
+                <a16:creationId xmlns:a16="http://schemas.microsoft.com/office/drawing/2014/main" id="{239E815B-4B4E-56E9-419A-60649A22BDFE}"/>
+              </a:ext>
+            </a:extLst>
+          </p:cNvPr>
+          <p:cNvSpPr/>
+          <p:nvPr/>
+        </p:nvSpPr>
+        <p:spPr>
+          <a:xfrm>
+            <a:off x="2423886" y="3411653"/>
+            <a:ext cx="7701817" cy="655497"/>
+          </a:xfrm>
+          <a:prstGeom prst="rect">
+            <a:avLst/>
+          </a:prstGeom>
+        </p:spPr>
+        <p:style>
+          <a:lnRef idx="2">
+            <a:schemeClr val="accent1">
+              <a:shade val="15000"/>
+            </a:schemeClr>
+          </a:lnRef>
+          <a:fillRef idx="1">
+            <a:schemeClr val="accent1"/>
+          </a:fillRef>
+          <a:effectRef idx="0">
+            <a:schemeClr val="accent1"/>
+          </a:effectRef>
+          <a:fontRef idx="minor">
+            <a:schemeClr val="lt1"/>
+          </a:fontRef>
+        </p:style>
+        <p:txBody>
+          <a:bodyPr rtlCol="0" anchor="ctr"/>
+          <a:lstStyle/>
+          <a:p>
+            <a:pPr algn="ctr"/>
+            <a:r>
+              <a:rPr lang="en-US" dirty="0"/>
+              <a:t>Source File storage</a:t>
+            </a:r>
+          </a:p>
+        </p:txBody>
+      </p:sp>
+      <p:pic>
+        <p:nvPicPr>
+          <p:cNvPr id="9" name="Picture 8" descr="Free Link Url vector and picture">
+            <a:extLst>
+              <a:ext uri="{FF2B5EF4-FFF2-40B4-BE49-F238E27FC236}">
+                <a16:creationId xmlns:a16="http://schemas.microsoft.com/office/drawing/2014/main" id="{0F36631B-49F9-498D-1D98-37E2A15FD566}"/>
+              </a:ext>
+            </a:extLst>
+          </p:cNvPr>
+          <p:cNvPicPr>
+            <a:picLocks noChangeAspect="1" noChangeArrowheads="1"/>
+          </p:cNvPicPr>
+          <p:nvPr/>
+        </p:nvPicPr>
+        <p:blipFill>
+          <a:blip r:embed="rId6">
+            <a:extLst>
+              <a:ext uri="{28A0092B-C50C-407E-A947-70E740481C1C}">
+                <a14:useLocalDpi xmlns:a14="http://schemas.microsoft.com/office/drawing/2010/main" val="0"/>
+              </a:ext>
+            </a:extLst>
+          </a:blip>
+          <a:srcRect/>
+          <a:stretch>
+            <a:fillRect/>
+          </a:stretch>
+        </p:blipFill>
+        <p:spPr bwMode="auto">
+          <a:xfrm>
+            <a:off x="10549855" y="1501275"/>
+            <a:ext cx="823992" cy="823992"/>
+          </a:xfrm>
+          <a:prstGeom prst="rect">
+            <a:avLst/>
+          </a:prstGeom>
+          <a:noFill/>
+          <a:extLst>
+            <a:ext uri="{909E8E84-426E-40DD-AFC4-6F175D3DCCD1}">
+              <a14:hiddenFill xmlns:a14="http://schemas.microsoft.com/office/drawing/2010/main">
+                <a:solidFill>
+                  <a:srgbClr val="FFFFFF"/>
+                </a:solidFill>
+              </a14:hiddenFill>
+            </a:ext>
+          </a:extLst>
+        </p:spPr>
+      </p:pic>
+      <p:sp>
+        <p:nvSpPr>
+          <p:cNvPr id="11" name="Cylinder 10">
+            <a:extLst>
+              <a:ext uri="{FF2B5EF4-FFF2-40B4-BE49-F238E27FC236}">
+                <a16:creationId xmlns:a16="http://schemas.microsoft.com/office/drawing/2014/main" id="{35D0D1B6-5528-2216-5D68-93965A8E6391}"/>
+              </a:ext>
+            </a:extLst>
+          </p:cNvPr>
+          <p:cNvSpPr/>
+          <p:nvPr/>
+        </p:nvSpPr>
+        <p:spPr>
+          <a:xfrm>
+            <a:off x="1597821" y="1598006"/>
+            <a:ext cx="711200" cy="551543"/>
+          </a:xfrm>
+          <a:prstGeom prst="can">
+            <a:avLst/>
+          </a:prstGeom>
+        </p:spPr>
+        <p:style>
+          <a:lnRef idx="2">
+            <a:schemeClr val="accent1">
+              <a:shade val="15000"/>
+            </a:schemeClr>
+          </a:lnRef>
+          <a:fillRef idx="1">
+            <a:schemeClr val="accent1"/>
+          </a:fillRef>
+          <a:effectRef idx="0">
+            <a:schemeClr val="accent1"/>
+          </a:effectRef>
+          <a:fontRef idx="minor">
+            <a:schemeClr val="lt1"/>
+          </a:fontRef>
+        </p:style>
+        <p:txBody>
+          <a:bodyPr rtlCol="0" anchor="ctr"/>
+          <a:lstStyle/>
+          <a:p>
+            <a:pPr algn="ctr"/>
+            <a:r>
+              <a:rPr lang="en-US" sz="1200" dirty="0"/>
+              <a:t>CMIS</a:t>
+            </a:r>
+          </a:p>
+        </p:txBody>
+      </p:sp>
+      <p:pic>
+        <p:nvPicPr>
+          <p:cNvPr id="14" name="Picture 2" descr="json Vector Icons free download in SVG, PNG Format">
+            <a:extLst>
+              <a:ext uri="{FF2B5EF4-FFF2-40B4-BE49-F238E27FC236}">
+                <a16:creationId xmlns:a16="http://schemas.microsoft.com/office/drawing/2014/main" id="{32F3DD71-DC96-D00E-576C-24EB3BBF0646}"/>
+              </a:ext>
+            </a:extLst>
+          </p:cNvPr>
+          <p:cNvPicPr>
+            <a:picLocks noChangeAspect="1" noChangeArrowheads="1"/>
+          </p:cNvPicPr>
+          <p:nvPr/>
+        </p:nvPicPr>
+        <p:blipFill>
+          <a:blip r:embed="rId2">
+            <a:extLst>
+              <a:ext uri="{28A0092B-C50C-407E-A947-70E740481C1C}">
+                <a14:useLocalDpi xmlns:a14="http://schemas.microsoft.com/office/drawing/2010/main" val="0"/>
+              </a:ext>
+            </a:extLst>
+          </a:blip>
+          <a:srcRect/>
+          <a:stretch>
+            <a:fillRect/>
+          </a:stretch>
+        </p:blipFill>
+        <p:spPr bwMode="auto">
+          <a:xfrm flipV="1">
+            <a:off x="3030259" y="1501275"/>
+            <a:ext cx="711201" cy="711201"/>
+          </a:xfrm>
+          <a:prstGeom prst="rect">
+            <a:avLst/>
+          </a:prstGeom>
+          <a:noFill/>
+          <a:extLst>
+            <a:ext uri="{909E8E84-426E-40DD-AFC4-6F175D3DCCD1}">
+              <a14:hiddenFill xmlns:a14="http://schemas.microsoft.com/office/drawing/2010/main">
+                <a:solidFill>
+                  <a:srgbClr val="FFFFFF"/>
+                </a:solidFill>
+              </a14:hiddenFill>
+            </a:ext>
+          </a:extLst>
+        </p:spPr>
+      </p:pic>
+      <p:pic>
+        <p:nvPicPr>
+          <p:cNvPr id="16" name="Picture 4" descr="Free Folder SVG, PNG Icon, Symbol. Download Image.">
+            <a:extLst>
+              <a:ext uri="{FF2B5EF4-FFF2-40B4-BE49-F238E27FC236}">
+                <a16:creationId xmlns:a16="http://schemas.microsoft.com/office/drawing/2014/main" id="{36CE696E-F0FD-14A2-A096-ECD514D3D0A6}"/>
+              </a:ext>
+            </a:extLst>
+          </p:cNvPr>
+          <p:cNvPicPr>
+            <a:picLocks noChangeAspect="1" noChangeArrowheads="1"/>
+          </p:cNvPicPr>
+          <p:nvPr/>
+        </p:nvPicPr>
+        <p:blipFill>
+          <a:blip r:embed="rId3">
+            <a:extLst>
+              <a:ext uri="{28A0092B-C50C-407E-A947-70E740481C1C}">
+                <a14:useLocalDpi xmlns:a14="http://schemas.microsoft.com/office/drawing/2010/main" val="0"/>
+              </a:ext>
+            </a:extLst>
+          </a:blip>
+          <a:srcRect/>
+          <a:stretch>
+            <a:fillRect/>
+          </a:stretch>
+        </p:blipFill>
+        <p:spPr bwMode="auto">
+          <a:xfrm>
+            <a:off x="4771729" y="1363384"/>
+            <a:ext cx="943426" cy="943426"/>
+          </a:xfrm>
+          <a:prstGeom prst="rect">
+            <a:avLst/>
+          </a:prstGeom>
+          <a:noFill/>
+          <a:extLst>
+            <a:ext uri="{909E8E84-426E-40DD-AFC4-6F175D3DCCD1}">
+              <a14:hiddenFill xmlns:a14="http://schemas.microsoft.com/office/drawing/2010/main">
+                <a:solidFill>
+                  <a:srgbClr val="FFFFFF"/>
+                </a:solidFill>
+              </a14:hiddenFill>
+            </a:ext>
+          </a:extLst>
+        </p:spPr>
+      </p:pic>
+      <p:pic>
+        <p:nvPicPr>
+          <p:cNvPr id="17" name="Picture 6" descr="Folder Dossier Temps SZ icon">
+            <a:extLst>
+              <a:ext uri="{FF2B5EF4-FFF2-40B4-BE49-F238E27FC236}">
+                <a16:creationId xmlns:a16="http://schemas.microsoft.com/office/drawing/2014/main" id="{4EC4F55D-8CA7-EC18-4034-F386E5935A29}"/>
+              </a:ext>
+            </a:extLst>
+          </p:cNvPr>
+          <p:cNvPicPr>
+            <a:picLocks noChangeAspect="1" noChangeArrowheads="1"/>
+          </p:cNvPicPr>
+          <p:nvPr/>
+        </p:nvPicPr>
+        <p:blipFill>
+          <a:blip r:embed="rId4">
+            <a:extLst>
+              <a:ext uri="{28A0092B-C50C-407E-A947-70E740481C1C}">
+                <a14:useLocalDpi xmlns:a14="http://schemas.microsoft.com/office/drawing/2010/main" val="0"/>
+              </a:ext>
+            </a:extLst>
+          </a:blip>
+          <a:srcRect/>
+          <a:stretch>
+            <a:fillRect/>
+          </a:stretch>
+        </p:blipFill>
+        <p:spPr bwMode="auto">
+          <a:xfrm>
+            <a:off x="7049970" y="1300645"/>
+            <a:ext cx="1084882" cy="1084882"/>
+          </a:xfrm>
+          <a:prstGeom prst="rect">
+            <a:avLst/>
+          </a:prstGeom>
+          <a:noFill/>
+          <a:extLst>
+            <a:ext uri="{909E8E84-426E-40DD-AFC4-6F175D3DCCD1}">
+              <a14:hiddenFill xmlns:a14="http://schemas.microsoft.com/office/drawing/2010/main">
+                <a:solidFill>
+                  <a:srgbClr val="FFFFFF"/>
+                </a:solidFill>
+              </a14:hiddenFill>
+            </a:ext>
+          </a:extLst>
+        </p:spPr>
+      </p:pic>
+      <p:sp>
+        <p:nvSpPr>
+          <p:cNvPr id="18" name="TextBox 17">
+            <a:extLst>
+              <a:ext uri="{FF2B5EF4-FFF2-40B4-BE49-F238E27FC236}">
+                <a16:creationId xmlns:a16="http://schemas.microsoft.com/office/drawing/2014/main" id="{9438B1B4-1AAC-6763-8BD0-2B8C5BF0E56F}"/>
+              </a:ext>
+            </a:extLst>
+          </p:cNvPr>
+          <p:cNvSpPr txBox="1"/>
+          <p:nvPr/>
+        </p:nvSpPr>
+        <p:spPr>
+          <a:xfrm>
+            <a:off x="1312516" y="2499210"/>
+            <a:ext cx="10346635" cy="369332"/>
+          </a:xfrm>
+          <a:prstGeom prst="rect">
+            <a:avLst/>
+          </a:prstGeom>
+          <a:noFill/>
+        </p:spPr>
+        <p:txBody>
+          <a:bodyPr wrap="square" rtlCol="0">
+            <a:spAutoFit/>
+          </a:bodyPr>
+          <a:lstStyle/>
+          <a:p>
+            <a:r>
+              <a:rPr lang="en-US" dirty="0"/>
+              <a:t>     CMIS		JSON		Folder		Temporary folder	 Camunda 8 Doc          URL</a:t>
+            </a:r>
+          </a:p>
+        </p:txBody>
+      </p:sp>
+      <p:pic>
+        <p:nvPicPr>
+          <p:cNvPr id="19" name="Picture 18">
+            <a:extLst>
+              <a:ext uri="{FF2B5EF4-FFF2-40B4-BE49-F238E27FC236}">
+                <a16:creationId xmlns:a16="http://schemas.microsoft.com/office/drawing/2014/main" id="{22F1579F-DA98-070D-92B9-C2F37FA6E68A}"/>
+              </a:ext>
+            </a:extLst>
+          </p:cNvPr>
+          <p:cNvPicPr>
+            <a:picLocks noChangeAspect="1"/>
+          </p:cNvPicPr>
+          <p:nvPr/>
+        </p:nvPicPr>
+        <p:blipFill>
+          <a:blip r:embed="rId5"/>
+          <a:stretch>
+            <a:fillRect/>
+          </a:stretch>
+        </p:blipFill>
+        <p:spPr>
+          <a:xfrm>
+            <a:off x="8726692" y="1702414"/>
+            <a:ext cx="1018095" cy="342725"/>
+          </a:xfrm>
+          <a:prstGeom prst="rect">
+            <a:avLst/>
+          </a:prstGeom>
+        </p:spPr>
+      </p:pic>
+      <p:sp>
+        <p:nvSpPr>
+          <p:cNvPr id="21" name="TextBox 20">
+            <a:extLst>
+              <a:ext uri="{FF2B5EF4-FFF2-40B4-BE49-F238E27FC236}">
+                <a16:creationId xmlns:a16="http://schemas.microsoft.com/office/drawing/2014/main" id="{7BC76472-FE50-CB82-20A5-568A4A0A33D0}"/>
+              </a:ext>
+            </a:extLst>
+          </p:cNvPr>
+          <p:cNvSpPr txBox="1"/>
+          <p:nvPr/>
+        </p:nvSpPr>
+        <p:spPr>
+          <a:xfrm>
+            <a:off x="49971" y="3605485"/>
+            <a:ext cx="2199000" cy="646331"/>
+          </a:xfrm>
+          <a:prstGeom prst="rect">
+            <a:avLst/>
+          </a:prstGeom>
+          <a:noFill/>
+        </p:spPr>
+        <p:txBody>
+          <a:bodyPr wrap="none" rtlCol="0">
+            <a:spAutoFit/>
+          </a:bodyPr>
+          <a:lstStyle/>
+          <a:p>
+            <a:r>
+              <a:rPr lang="en-US" dirty="0"/>
+              <a:t>Source File Reference</a:t>
+            </a:r>
+          </a:p>
+          <a:p>
+            <a:r>
+              <a:rPr lang="en-US" dirty="0"/>
+              <a:t>Storage definition</a:t>
+            </a:r>
+          </a:p>
+        </p:txBody>
+      </p:sp>
+    </p:spTree>
+    <p:extLst>
+      <p:ext uri="{BB962C8B-B14F-4D97-AF65-F5344CB8AC3E}">
+        <p14:creationId xmlns:p14="http://schemas.microsoft.com/office/powerpoint/2010/main" val="805668926"/>
       </p:ext>
     </p:extLst>
   </p:cSld>

</xml_diff>

<commit_message>
1.1.0 using FileStorage 2.1.1 (#36)
* 1.1.0 using FileStorage 2.1.1

* 1.1.0 using FileStorage 2.1.1

* #34 fix

* 1.1.0 using FileStorage 2.1.1

* 1.1.0 using FileStorage 2.1.1

* Migrate cache V3

* merge
</commit_message>
<xml_diff>
--- a/doc/images.pptx
+++ b/doc/images.pptx
@@ -8,6 +8,7 @@
     <p:sldId id="256" r:id="rId2"/>
     <p:sldId id="257" r:id="rId3"/>
     <p:sldId id="258" r:id="rId4"/>
+    <p:sldId id="259" r:id="rId5"/>
   </p:sldIdLst>
   <p:sldSz cx="12192000" cy="6858000"/>
   <p:notesSz cx="6858000" cy="9144000"/>
@@ -261,7 +262,7 @@
           <a:p>
             <a:fld id="{27C5939A-5517-4BD5-8EC4-A9D53E5E1772}" type="datetimeFigureOut">
               <a:rPr lang="en-US" smtClean="0"/>
-              <a:t>8/8/2024</a:t>
+              <a:t>9/22/2025</a:t>
             </a:fld>
             <a:endParaRPr lang="en-US"/>
           </a:p>
@@ -459,7 +460,7 @@
           <a:p>
             <a:fld id="{27C5939A-5517-4BD5-8EC4-A9D53E5E1772}" type="datetimeFigureOut">
               <a:rPr lang="en-US" smtClean="0"/>
-              <a:t>8/8/2024</a:t>
+              <a:t>9/22/2025</a:t>
             </a:fld>
             <a:endParaRPr lang="en-US"/>
           </a:p>
@@ -667,7 +668,7 @@
           <a:p>
             <a:fld id="{27C5939A-5517-4BD5-8EC4-A9D53E5E1772}" type="datetimeFigureOut">
               <a:rPr lang="en-US" smtClean="0"/>
-              <a:t>8/8/2024</a:t>
+              <a:t>9/22/2025</a:t>
             </a:fld>
             <a:endParaRPr lang="en-US"/>
           </a:p>
@@ -865,7 +866,7 @@
           <a:p>
             <a:fld id="{27C5939A-5517-4BD5-8EC4-A9D53E5E1772}" type="datetimeFigureOut">
               <a:rPr lang="en-US" smtClean="0"/>
-              <a:t>8/8/2024</a:t>
+              <a:t>9/22/2025</a:t>
             </a:fld>
             <a:endParaRPr lang="en-US"/>
           </a:p>
@@ -1140,7 +1141,7 @@
           <a:p>
             <a:fld id="{27C5939A-5517-4BD5-8EC4-A9D53E5E1772}" type="datetimeFigureOut">
               <a:rPr lang="en-US" smtClean="0"/>
-              <a:t>8/8/2024</a:t>
+              <a:t>9/22/2025</a:t>
             </a:fld>
             <a:endParaRPr lang="en-US"/>
           </a:p>
@@ -1405,7 +1406,7 @@
           <a:p>
             <a:fld id="{27C5939A-5517-4BD5-8EC4-A9D53E5E1772}" type="datetimeFigureOut">
               <a:rPr lang="en-US" smtClean="0"/>
-              <a:t>8/8/2024</a:t>
+              <a:t>9/22/2025</a:t>
             </a:fld>
             <a:endParaRPr lang="en-US"/>
           </a:p>
@@ -1817,7 +1818,7 @@
           <a:p>
             <a:fld id="{27C5939A-5517-4BD5-8EC4-A9D53E5E1772}" type="datetimeFigureOut">
               <a:rPr lang="en-US" smtClean="0"/>
-              <a:t>8/8/2024</a:t>
+              <a:t>9/22/2025</a:t>
             </a:fld>
             <a:endParaRPr lang="en-US"/>
           </a:p>
@@ -1958,7 +1959,7 @@
           <a:p>
             <a:fld id="{27C5939A-5517-4BD5-8EC4-A9D53E5E1772}" type="datetimeFigureOut">
               <a:rPr lang="en-US" smtClean="0"/>
-              <a:t>8/8/2024</a:t>
+              <a:t>9/22/2025</a:t>
             </a:fld>
             <a:endParaRPr lang="en-US"/>
           </a:p>
@@ -2071,7 +2072,7 @@
           <a:p>
             <a:fld id="{27C5939A-5517-4BD5-8EC4-A9D53E5E1772}" type="datetimeFigureOut">
               <a:rPr lang="en-US" smtClean="0"/>
-              <a:t>8/8/2024</a:t>
+              <a:t>9/22/2025</a:t>
             </a:fld>
             <a:endParaRPr lang="en-US"/>
           </a:p>
@@ -2382,7 +2383,7 @@
           <a:p>
             <a:fld id="{27C5939A-5517-4BD5-8EC4-A9D53E5E1772}" type="datetimeFigureOut">
               <a:rPr lang="en-US" smtClean="0"/>
-              <a:t>8/8/2024</a:t>
+              <a:t>9/22/2025</a:t>
             </a:fld>
             <a:endParaRPr lang="en-US"/>
           </a:p>
@@ -2670,7 +2671,7 @@
           <a:p>
             <a:fld id="{27C5939A-5517-4BD5-8EC4-A9D53E5E1772}" type="datetimeFigureOut">
               <a:rPr lang="en-US" smtClean="0"/>
-              <a:t>8/8/2024</a:t>
+              <a:t>9/22/2025</a:t>
             </a:fld>
             <a:endParaRPr lang="en-US"/>
           </a:p>
@@ -2911,7 +2912,7 @@
           <a:p>
             <a:fld id="{27C5939A-5517-4BD5-8EC4-A9D53E5E1772}" type="datetimeFigureOut">
               <a:rPr lang="en-US" smtClean="0"/>
-              <a:t>8/8/2024</a:t>
+              <a:t>9/22/2025</a:t>
             </a:fld>
             <a:endParaRPr lang="en-US"/>
           </a:p>
@@ -3342,8 +3343,8 @@
         </p:nvSpPr>
         <p:spPr>
           <a:xfrm>
-            <a:off x="196807" y="2094790"/>
-            <a:ext cx="2143792" cy="1477328"/>
+            <a:off x="110793" y="1333462"/>
+            <a:ext cx="2143792" cy="2031325"/>
           </a:xfrm>
           <a:prstGeom prst="rect">
             <a:avLst/>
@@ -3364,6 +3365,20 @@
               <a:rPr lang="en-US" dirty="0"/>
               <a:t>Storage definition</a:t>
             </a:r>
+          </a:p>
+          <a:p>
+            <a:pPr marL="285750" indent="-285750">
+              <a:buFont typeface="Arial" panose="020B0604020202020204" pitchFamily="34" charset="0"/>
+              <a:buChar char="•"/>
+            </a:pPr>
+            <a:endParaRPr lang="en-US" dirty="0"/>
+          </a:p>
+          <a:p>
+            <a:pPr marL="285750" indent="-285750">
+              <a:buFont typeface="Arial" panose="020B0604020202020204" pitchFamily="34" charset="0"/>
+              <a:buChar char="•"/>
+            </a:pPr>
+            <a:endParaRPr lang="en-US" dirty="0"/>
           </a:p>
           <a:p>
             <a:pPr marL="285750" indent="-285750">
@@ -3451,7 +3466,30 @@
             <a:pPr algn="ctr"/>
             <a:r>
               <a:rPr lang="en-US" dirty="0"/>
-              <a:t>File storage</a:t>
+              <a:t>Connector</a:t>
+            </a:r>
+          </a:p>
+          <a:p>
+            <a:pPr algn="ctr"/>
+            <a:endParaRPr lang="en-US" dirty="0"/>
+          </a:p>
+          <a:p>
+            <a:pPr algn="ctr"/>
+            <a:endParaRPr lang="en-US" dirty="0"/>
+          </a:p>
+          <a:p>
+            <a:pPr algn="ctr"/>
+            <a:endParaRPr lang="en-US" dirty="0"/>
+          </a:p>
+          <a:p>
+            <a:pPr algn="ctr"/>
+            <a:endParaRPr lang="en-US" dirty="0"/>
+          </a:p>
+          <a:p>
+            <a:pPr algn="ctr"/>
+            <a:r>
+              <a:rPr lang="en-US" dirty="0"/>
+              <a:t>storage</a:t>
             </a:r>
           </a:p>
         </p:txBody>
@@ -3568,7 +3606,7 @@
         </p:nvSpPr>
         <p:spPr>
           <a:xfrm>
-            <a:off x="1182689" y="2453735"/>
+            <a:off x="1241103" y="2260875"/>
             <a:ext cx="403733" cy="481353"/>
           </a:xfrm>
           <a:prstGeom prst="foldedCorner">
@@ -3803,7 +3841,7 @@
         <p:spPr>
           <a:xfrm>
             <a:off x="2119086" y="6440711"/>
-            <a:ext cx="7341946" cy="369332"/>
+            <a:ext cx="9456307" cy="369332"/>
           </a:xfrm>
           <a:prstGeom prst="rect">
             <a:avLst/>
@@ -3818,7 +3856,7 @@
           <a:p>
             <a:r>
               <a:rPr lang="en-US" dirty="0"/>
-              <a:t>     CMIS		JSON		Folder		Temporary folder</a:t>
+              <a:t>     CMIS		JSON		Folder		Temporary folder             Camunda 8 Doc</a:t>
             </a:r>
           </a:p>
         </p:txBody>
@@ -3979,6 +4017,36 @@
               </a14:hiddenFill>
             </a:ext>
           </a:extLst>
+        </p:spPr>
+      </p:pic>
+      <p:pic>
+        <p:nvPicPr>
+          <p:cNvPr id="13" name="Picture 12">
+            <a:extLst>
+              <a:ext uri="{FF2B5EF4-FFF2-40B4-BE49-F238E27FC236}">
+                <a16:creationId xmlns:a16="http://schemas.microsoft.com/office/drawing/2014/main" id="{3F0C134B-F590-769A-7584-963E5C950043}"/>
+              </a:ext>
+            </a:extLst>
+          </p:cNvPr>
+          <p:cNvPicPr>
+            <a:picLocks noChangeAspect="1"/>
+          </p:cNvPicPr>
+          <p:nvPr/>
+        </p:nvPicPr>
+        <p:blipFill>
+          <a:blip r:embed="rId6"/>
+          <a:stretch>
+            <a:fillRect/>
+          </a:stretch>
+        </p:blipFill>
+        <p:spPr>
+          <a:xfrm>
+            <a:off x="10078742" y="5599202"/>
+            <a:ext cx="1018095" cy="342725"/>
+          </a:xfrm>
+          <a:prstGeom prst="rect">
+            <a:avLst/>
+          </a:prstGeom>
         </p:spPr>
       </p:pic>
     </p:spTree>
@@ -4013,10 +4081,10 @@
       </p:grpSpPr>
       <p:sp>
         <p:nvSpPr>
-          <p:cNvPr id="4" name="Rectangle 3">
-            <a:extLst>
-              <a:ext uri="{FF2B5EF4-FFF2-40B4-BE49-F238E27FC236}">
-                <a16:creationId xmlns:a16="http://schemas.microsoft.com/office/drawing/2014/main" id="{50BD0FF2-14C0-B769-4A9B-8342386C3B83}"/>
+          <p:cNvPr id="8" name="Rectangle 7">
+            <a:extLst>
+              <a:ext uri="{FF2B5EF4-FFF2-40B4-BE49-F238E27FC236}">
+                <a16:creationId xmlns:a16="http://schemas.microsoft.com/office/drawing/2014/main" id="{04103266-9C82-B892-0379-C81794D8B79B}"/>
               </a:ext>
             </a:extLst>
           </p:cNvPr>
@@ -4025,12 +4093,18 @@
         </p:nvSpPr>
         <p:spPr>
           <a:xfrm>
-            <a:off x="1654629" y="3614304"/>
-            <a:ext cx="9329381" cy="1084881"/>
+            <a:off x="1669775" y="2916272"/>
+            <a:ext cx="9680707" cy="1935314"/>
           </a:xfrm>
           <a:prstGeom prst="rect">
             <a:avLst/>
           </a:prstGeom>
+          <a:solidFill>
+            <a:schemeClr val="accent6">
+              <a:lumMod val="60000"/>
+              <a:lumOff val="40000"/>
+            </a:schemeClr>
+          </a:solidFill>
         </p:spPr>
         <p:style>
           <a:lnRef idx="2">
@@ -4055,17 +4129,37 @@
             <a:pPr algn="ctr"/>
             <a:r>
               <a:rPr lang="en-US" dirty="0"/>
-              <a:t>File storage</a:t>
-            </a:r>
-          </a:p>
-        </p:txBody>
-      </p:sp>
-      <p:sp>
-        <p:nvSpPr>
-          <p:cNvPr id="6" name="Rectangle: Folded Corner 5">
-            <a:extLst>
-              <a:ext uri="{FF2B5EF4-FFF2-40B4-BE49-F238E27FC236}">
-                <a16:creationId xmlns:a16="http://schemas.microsoft.com/office/drawing/2014/main" id="{6ED70ECE-5B8D-8A8F-54C1-EF39E0C062AC}"/>
+              <a:t>Connector</a:t>
+            </a:r>
+          </a:p>
+          <a:p>
+            <a:pPr algn="ctr"/>
+            <a:endParaRPr lang="en-US" dirty="0"/>
+          </a:p>
+          <a:p>
+            <a:pPr algn="ctr"/>
+            <a:endParaRPr lang="en-US" dirty="0"/>
+          </a:p>
+          <a:p>
+            <a:pPr algn="ctr"/>
+            <a:endParaRPr lang="en-US" dirty="0"/>
+          </a:p>
+          <a:p>
+            <a:pPr algn="ctr"/>
+            <a:endParaRPr lang="en-US" dirty="0"/>
+          </a:p>
+          <a:p>
+            <a:pPr algn="ctr"/>
+            <a:endParaRPr lang="en-US" dirty="0"/>
+          </a:p>
+        </p:txBody>
+      </p:sp>
+      <p:sp>
+        <p:nvSpPr>
+          <p:cNvPr id="4" name="Rectangle 3">
+            <a:extLst>
+              <a:ext uri="{FF2B5EF4-FFF2-40B4-BE49-F238E27FC236}">
+                <a16:creationId xmlns:a16="http://schemas.microsoft.com/office/drawing/2014/main" id="{50BD0FF2-14C0-B769-4A9B-8342386C3B83}"/>
               </a:ext>
             </a:extLst>
           </p:cNvPr>
@@ -4074,18 +4168,12 @@
         </p:nvSpPr>
         <p:spPr>
           <a:xfrm>
-            <a:off x="4840514" y="2640032"/>
-            <a:ext cx="537029" cy="638628"/>
-          </a:xfrm>
-          <a:prstGeom prst="foldedCorner">
-            <a:avLst/>
-          </a:prstGeom>
-          <a:solidFill>
-            <a:schemeClr val="accent2">
-              <a:lumMod val="60000"/>
-              <a:lumOff val="40000"/>
-            </a:schemeClr>
-          </a:solidFill>
+            <a:off x="1967949" y="3614304"/>
+            <a:ext cx="9016061" cy="1084881"/>
+          </a:xfrm>
+          <a:prstGeom prst="rect">
+            <a:avLst/>
+          </a:prstGeom>
         </p:spPr>
         <p:style>
           <a:lnRef idx="2">
@@ -4108,7 +4196,10 @@
           <a:lstStyle/>
           <a:p>
             <a:pPr algn="ctr"/>
-            <a:endParaRPr lang="en-US"/>
+            <a:r>
+              <a:rPr lang="en-US" dirty="0"/>
+              <a:t>File storage</a:t>
+            </a:r>
           </a:p>
         </p:txBody>
       </p:sp>
@@ -4128,8 +4219,8 @@
         </p:nvCxnSpPr>
         <p:spPr>
           <a:xfrm>
-            <a:off x="2423886" y="1996035"/>
-            <a:ext cx="0" cy="1618269"/>
+            <a:off x="457200" y="3910185"/>
+            <a:ext cx="1212575" cy="0"/>
           </a:xfrm>
           <a:prstGeom prst="straightConnector1">
             <a:avLst/>
@@ -4200,47 +4291,6 @@
           </a:extLst>
         </p:spPr>
       </p:pic>
-      <p:cxnSp>
-        <p:nvCxnSpPr>
-          <p:cNvPr id="15" name="Straight Arrow Connector 14">
-            <a:extLst>
-              <a:ext uri="{FF2B5EF4-FFF2-40B4-BE49-F238E27FC236}">
-                <a16:creationId xmlns:a16="http://schemas.microsoft.com/office/drawing/2014/main" id="{E18937E8-5D5F-B329-4661-44671BC7793F}"/>
-              </a:ext>
-            </a:extLst>
-          </p:cNvPr>
-          <p:cNvCxnSpPr>
-            <a:cxnSpLocks/>
-          </p:cNvCxnSpPr>
-          <p:nvPr/>
-        </p:nvCxnSpPr>
-        <p:spPr>
-          <a:xfrm flipV="1">
-            <a:off x="4572000" y="2551004"/>
-            <a:ext cx="0" cy="1063300"/>
-          </a:xfrm>
-          <a:prstGeom prst="straightConnector1">
-            <a:avLst/>
-          </a:prstGeom>
-          <a:ln w="38100">
-            <a:tailEnd type="triangle"/>
-          </a:ln>
-        </p:spPr>
-        <p:style>
-          <a:lnRef idx="1">
-            <a:schemeClr val="accent1"/>
-          </a:lnRef>
-          <a:fillRef idx="0">
-            <a:schemeClr val="accent1"/>
-          </a:fillRef>
-          <a:effectRef idx="0">
-            <a:schemeClr val="accent1"/>
-          </a:effectRef>
-          <a:fontRef idx="minor">
-            <a:schemeClr val="tx1"/>
-          </a:fontRef>
-        </p:style>
-      </p:cxnSp>
       <p:sp>
         <p:nvSpPr>
           <p:cNvPr id="20" name="TextBox 19">
@@ -4255,8 +4305,8 @@
         </p:nvSpPr>
         <p:spPr>
           <a:xfrm>
-            <a:off x="2528277" y="2197279"/>
-            <a:ext cx="1506695" cy="369332"/>
+            <a:off x="169334" y="3090063"/>
+            <a:ext cx="1506695" cy="646331"/>
           </a:xfrm>
           <a:prstGeom prst="rect">
             <a:avLst/>
@@ -4274,6 +4324,12 @@
               <a:t>File Reference</a:t>
             </a:r>
           </a:p>
+          <a:p>
+            <a:r>
+              <a:rPr lang="en-US" dirty="0"/>
+              <a:t>Folder</a:t>
+            </a:r>
+          </a:p>
         </p:txBody>
       </p:sp>
       <p:sp>
@@ -4290,7 +4346,7 @@
         </p:nvSpPr>
         <p:spPr>
           <a:xfrm>
-            <a:off x="4746173" y="2197279"/>
+            <a:off x="4777630" y="1753536"/>
             <a:ext cx="511679" cy="369332"/>
           </a:xfrm>
           <a:prstGeom prst="rect">
@@ -4360,7 +4416,7 @@
         </p:nvSpPr>
         <p:spPr>
           <a:xfrm>
-            <a:off x="2423886" y="5442857"/>
+            <a:off x="1207987" y="5442857"/>
             <a:ext cx="711200" cy="551543"/>
           </a:xfrm>
           <a:prstGeom prst="can">
@@ -4424,7 +4480,7 @@
         </p:blipFill>
         <p:spPr bwMode="auto">
           <a:xfrm flipV="1">
-            <a:off x="3856324" y="5346126"/>
+            <a:off x="2640425" y="5346126"/>
             <a:ext cx="711201" cy="711201"/>
           </a:xfrm>
           <a:prstGeom prst="rect">
@@ -4471,7 +4527,7 @@
         </p:blipFill>
         <p:spPr bwMode="auto">
           <a:xfrm>
-            <a:off x="5624287" y="5208235"/>
+            <a:off x="4381895" y="5208235"/>
             <a:ext cx="943426" cy="943426"/>
           </a:xfrm>
           <a:prstGeom prst="rect">
@@ -4518,7 +4574,7 @@
         </p:blipFill>
         <p:spPr bwMode="auto">
           <a:xfrm>
-            <a:off x="7902528" y="5145496"/>
+            <a:off x="6660136" y="5145496"/>
             <a:ext cx="1084882" cy="1084882"/>
           </a:xfrm>
           <a:prstGeom prst="rect">
@@ -4550,8 +4606,8 @@
         </p:nvSpPr>
         <p:spPr>
           <a:xfrm>
-            <a:off x="2119086" y="6440711"/>
-            <a:ext cx="8864927" cy="369332"/>
+            <a:off x="922682" y="6344061"/>
+            <a:ext cx="10346635" cy="369332"/>
           </a:xfrm>
           <a:prstGeom prst="rect">
             <a:avLst/>
@@ -4559,18 +4615,141 @@
           <a:noFill/>
         </p:spPr>
         <p:txBody>
-          <a:bodyPr wrap="none" rtlCol="0">
+          <a:bodyPr wrap="square" rtlCol="0">
             <a:spAutoFit/>
           </a:bodyPr>
           <a:lstStyle/>
           <a:p>
             <a:r>
               <a:rPr lang="en-US" dirty="0"/>
-              <a:t>     CMIS		JSON		Folder		Temporary folder		URL</a:t>
-            </a:r>
-          </a:p>
-        </p:txBody>
-      </p:sp>
+              <a:t>     CMIS		JSON		Folder		Temporary folder	 Camunda 8 Doc          URL</a:t>
+            </a:r>
+          </a:p>
+        </p:txBody>
+      </p:sp>
+      <p:pic>
+        <p:nvPicPr>
+          <p:cNvPr id="5" name="Picture 4">
+            <a:extLst>
+              <a:ext uri="{FF2B5EF4-FFF2-40B4-BE49-F238E27FC236}">
+                <a16:creationId xmlns:a16="http://schemas.microsoft.com/office/drawing/2014/main" id="{2678EB3E-C516-D591-C18E-95461C02205A}"/>
+              </a:ext>
+            </a:extLst>
+          </p:cNvPr>
+          <p:cNvPicPr>
+            <a:picLocks noChangeAspect="1"/>
+          </p:cNvPicPr>
+          <p:nvPr/>
+        </p:nvPicPr>
+        <p:blipFill>
+          <a:blip r:embed="rId6"/>
+          <a:stretch>
+            <a:fillRect/>
+          </a:stretch>
+        </p:blipFill>
+        <p:spPr>
+          <a:xfrm>
+            <a:off x="8336858" y="5547265"/>
+            <a:ext cx="1018095" cy="342725"/>
+          </a:xfrm>
+          <a:prstGeom prst="rect">
+            <a:avLst/>
+          </a:prstGeom>
+        </p:spPr>
+      </p:pic>
+      <p:sp>
+        <p:nvSpPr>
+          <p:cNvPr id="18" name="Rectangle: Folded Corner 17">
+            <a:extLst>
+              <a:ext uri="{FF2B5EF4-FFF2-40B4-BE49-F238E27FC236}">
+                <a16:creationId xmlns:a16="http://schemas.microsoft.com/office/drawing/2014/main" id="{4027A38E-ED7A-BBAB-F555-115883CCCBC7}"/>
+              </a:ext>
+            </a:extLst>
+          </p:cNvPr>
+          <p:cNvSpPr/>
+          <p:nvPr/>
+        </p:nvSpPr>
+        <p:spPr>
+          <a:xfrm>
+            <a:off x="4921588" y="2207883"/>
+            <a:ext cx="403733" cy="481353"/>
+          </a:xfrm>
+          <a:prstGeom prst="foldedCorner">
+            <a:avLst/>
+          </a:prstGeom>
+          <a:solidFill>
+            <a:schemeClr val="accent2">
+              <a:lumMod val="60000"/>
+              <a:lumOff val="40000"/>
+            </a:schemeClr>
+          </a:solidFill>
+        </p:spPr>
+        <p:style>
+          <a:lnRef idx="2">
+            <a:schemeClr val="accent1">
+              <a:shade val="15000"/>
+            </a:schemeClr>
+          </a:lnRef>
+          <a:fillRef idx="1">
+            <a:schemeClr val="accent1"/>
+          </a:fillRef>
+          <a:effectRef idx="0">
+            <a:schemeClr val="accent1"/>
+          </a:effectRef>
+          <a:fontRef idx="minor">
+            <a:schemeClr val="lt1"/>
+          </a:fontRef>
+        </p:style>
+        <p:txBody>
+          <a:bodyPr rtlCol="0" anchor="ctr"/>
+          <a:lstStyle/>
+          <a:p>
+            <a:pPr algn="ctr"/>
+            <a:endParaRPr lang="en-US"/>
+          </a:p>
+        </p:txBody>
+      </p:sp>
+      <p:cxnSp>
+        <p:nvCxnSpPr>
+          <p:cNvPr id="19" name="Straight Arrow Connector 18">
+            <a:extLst>
+              <a:ext uri="{FF2B5EF4-FFF2-40B4-BE49-F238E27FC236}">
+                <a16:creationId xmlns:a16="http://schemas.microsoft.com/office/drawing/2014/main" id="{F8996053-F631-2103-B21B-968744180653}"/>
+              </a:ext>
+            </a:extLst>
+          </p:cNvPr>
+          <p:cNvCxnSpPr>
+            <a:cxnSpLocks/>
+          </p:cNvCxnSpPr>
+          <p:nvPr/>
+        </p:nvCxnSpPr>
+        <p:spPr>
+          <a:xfrm flipV="1">
+            <a:off x="4651513" y="2097157"/>
+            <a:ext cx="0" cy="819115"/>
+          </a:xfrm>
+          <a:prstGeom prst="straightConnector1">
+            <a:avLst/>
+          </a:prstGeom>
+          <a:ln w="38100">
+            <a:tailEnd type="triangle"/>
+          </a:ln>
+        </p:spPr>
+        <p:style>
+          <a:lnRef idx="1">
+            <a:schemeClr val="accent1"/>
+          </a:lnRef>
+          <a:fillRef idx="0">
+            <a:schemeClr val="accent1"/>
+          </a:fillRef>
+          <a:effectRef idx="0">
+            <a:schemeClr val="accent1"/>
+          </a:effectRef>
+          <a:fontRef idx="minor">
+            <a:schemeClr val="tx1"/>
+          </a:fontRef>
+        </p:style>
+      </p:cxnSp>
     </p:spTree>
     <p:extLst>
       <p:ext uri="{BB962C8B-B14F-4D97-AF65-F5344CB8AC3E}">
@@ -4603,10 +4782,10 @@
       </p:grpSpPr>
       <p:sp>
         <p:nvSpPr>
-          <p:cNvPr id="4" name="Rectangle 3">
-            <a:extLst>
-              <a:ext uri="{FF2B5EF4-FFF2-40B4-BE49-F238E27FC236}">
-                <a16:creationId xmlns:a16="http://schemas.microsoft.com/office/drawing/2014/main" id="{50BD0FF2-14C0-B769-4A9B-8342386C3B83}"/>
+          <p:cNvPr id="2" name="Rectangle 1">
+            <a:extLst>
+              <a:ext uri="{FF2B5EF4-FFF2-40B4-BE49-F238E27FC236}">
+                <a16:creationId xmlns:a16="http://schemas.microsoft.com/office/drawing/2014/main" id="{8ECA315D-14BF-1FF0-DF31-204B99B6CF10}"/>
               </a:ext>
             </a:extLst>
           </p:cNvPr>
@@ -4615,12 +4794,18 @@
         </p:nvSpPr>
         <p:spPr>
           <a:xfrm>
-            <a:off x="1654629" y="3614304"/>
-            <a:ext cx="9158509" cy="1084881"/>
+            <a:off x="1378863" y="2916272"/>
+            <a:ext cx="9971620" cy="1935314"/>
           </a:xfrm>
           <a:prstGeom prst="rect">
             <a:avLst/>
           </a:prstGeom>
+          <a:solidFill>
+            <a:schemeClr val="accent6">
+              <a:lumMod val="60000"/>
+              <a:lumOff val="40000"/>
+            </a:schemeClr>
+          </a:solidFill>
         </p:spPr>
         <p:style>
           <a:lnRef idx="2">
@@ -4645,175 +4830,37 @@
             <a:pPr algn="ctr"/>
             <a:r>
               <a:rPr lang="en-US" dirty="0"/>
-              <a:t>File storage</a:t>
-            </a:r>
-          </a:p>
-        </p:txBody>
-      </p:sp>
-      <p:cxnSp>
-        <p:nvCxnSpPr>
-          <p:cNvPr id="10" name="Straight Arrow Connector 9">
-            <a:extLst>
-              <a:ext uri="{FF2B5EF4-FFF2-40B4-BE49-F238E27FC236}">
-                <a16:creationId xmlns:a16="http://schemas.microsoft.com/office/drawing/2014/main" id="{9DDDE992-1C60-E352-BB2C-56F4FADAE985}"/>
-              </a:ext>
-            </a:extLst>
-          </p:cNvPr>
-          <p:cNvCxnSpPr>
-            <a:cxnSpLocks/>
-          </p:cNvCxnSpPr>
-          <p:nvPr/>
-        </p:nvCxnSpPr>
-        <p:spPr>
-          <a:xfrm>
-            <a:off x="2423886" y="1996035"/>
-            <a:ext cx="0" cy="1618269"/>
-          </a:xfrm>
-          <a:prstGeom prst="straightConnector1">
-            <a:avLst/>
-          </a:prstGeom>
-          <a:ln w="38100">
-            <a:tailEnd type="triangle"/>
-          </a:ln>
-        </p:spPr>
-        <p:style>
-          <a:lnRef idx="1">
-            <a:schemeClr val="accent1"/>
-          </a:lnRef>
-          <a:fillRef idx="0">
-            <a:schemeClr val="accent1"/>
-          </a:fillRef>
-          <a:effectRef idx="0">
-            <a:schemeClr val="accent1"/>
-          </a:effectRef>
-          <a:fontRef idx="minor">
-            <a:schemeClr val="tx1"/>
-          </a:fontRef>
-        </p:style>
-      </p:cxnSp>
-      <p:sp>
-        <p:nvSpPr>
-          <p:cNvPr id="20" name="TextBox 19">
-            <a:extLst>
-              <a:ext uri="{FF2B5EF4-FFF2-40B4-BE49-F238E27FC236}">
-                <a16:creationId xmlns:a16="http://schemas.microsoft.com/office/drawing/2014/main" id="{96606B8C-7471-4670-BC2F-5D74357675CE}"/>
-              </a:ext>
-            </a:extLst>
-          </p:cNvPr>
-          <p:cNvSpPr txBox="1"/>
-          <p:nvPr/>
-        </p:nvSpPr>
-        <p:spPr>
-          <a:xfrm>
-            <a:off x="2528277" y="2197279"/>
-            <a:ext cx="1506695" cy="369332"/>
-          </a:xfrm>
-          <a:prstGeom prst="rect">
-            <a:avLst/>
-          </a:prstGeom>
-          <a:noFill/>
-        </p:spPr>
-        <p:txBody>
-          <a:bodyPr wrap="none" rtlCol="0">
-            <a:spAutoFit/>
-          </a:bodyPr>
-          <a:lstStyle/>
-          <a:p>
-            <a:r>
-              <a:rPr lang="en-US" dirty="0"/>
-              <a:t>File Reference</a:t>
-            </a:r>
-          </a:p>
-        </p:txBody>
-      </p:sp>
-      <p:sp>
-        <p:nvSpPr>
-          <p:cNvPr id="3" name="TextBox 2">
-            <a:extLst>
-              <a:ext uri="{FF2B5EF4-FFF2-40B4-BE49-F238E27FC236}">
-                <a16:creationId xmlns:a16="http://schemas.microsoft.com/office/drawing/2014/main" id="{186FAF21-AAF6-2794-6877-CEDD574F3324}"/>
-              </a:ext>
-            </a:extLst>
-          </p:cNvPr>
-          <p:cNvSpPr txBox="1"/>
-          <p:nvPr/>
-        </p:nvSpPr>
-        <p:spPr>
-          <a:xfrm>
-            <a:off x="4211925" y="787401"/>
-            <a:ext cx="2667462" cy="707886"/>
-          </a:xfrm>
-          <a:prstGeom prst="rect">
-            <a:avLst/>
-          </a:prstGeom>
-          <a:noFill/>
-        </p:spPr>
-        <p:txBody>
-          <a:bodyPr wrap="none" rtlCol="0">
-            <a:spAutoFit/>
-          </a:bodyPr>
-          <a:lstStyle/>
-          <a:p>
-            <a:r>
-              <a:rPr lang="en-US" sz="4000" dirty="0"/>
-              <a:t>Delete a file</a:t>
-            </a:r>
-          </a:p>
-        </p:txBody>
-      </p:sp>
-      <p:pic>
-        <p:nvPicPr>
-          <p:cNvPr id="7" name="Picture 8" descr="Free Link Url vector and picture">
-            <a:extLst>
-              <a:ext uri="{FF2B5EF4-FFF2-40B4-BE49-F238E27FC236}">
-                <a16:creationId xmlns:a16="http://schemas.microsoft.com/office/drawing/2014/main" id="{D881FE4A-294B-329A-CB07-24475DB1D306}"/>
-              </a:ext>
-            </a:extLst>
-          </p:cNvPr>
-          <p:cNvPicPr>
-            <a:picLocks noChangeAspect="1" noChangeArrowheads="1"/>
-          </p:cNvPicPr>
-          <p:nvPr/>
-        </p:nvPicPr>
-        <p:blipFill>
-          <a:blip r:embed="rId2">
-            <a:extLst>
-              <a:ext uri="{28A0092B-C50C-407E-A947-70E740481C1C}">
-                <a14:useLocalDpi xmlns:a14="http://schemas.microsoft.com/office/drawing/2010/main" val="0"/>
-              </a:ext>
-            </a:extLst>
-          </a:blip>
-          <a:srcRect/>
-          <a:stretch>
-            <a:fillRect/>
-          </a:stretch>
-        </p:blipFill>
-        <p:spPr bwMode="auto">
-          <a:xfrm>
-            <a:off x="10160021" y="5346126"/>
-            <a:ext cx="823992" cy="823992"/>
-          </a:xfrm>
-          <a:prstGeom prst="rect">
-            <a:avLst/>
-          </a:prstGeom>
-          <a:noFill/>
-          <a:extLst>
-            <a:ext uri="{909E8E84-426E-40DD-AFC4-6F175D3DCCD1}">
-              <a14:hiddenFill xmlns:a14="http://schemas.microsoft.com/office/drawing/2010/main">
-                <a:solidFill>
-                  <a:srgbClr val="FFFFFF"/>
-                </a:solidFill>
-              </a14:hiddenFill>
-            </a:ext>
-          </a:extLst>
-        </p:spPr>
-      </p:pic>
-      <p:sp>
-        <p:nvSpPr>
-          <p:cNvPr id="8" name="Cylinder 7">
-            <a:extLst>
-              <a:ext uri="{FF2B5EF4-FFF2-40B4-BE49-F238E27FC236}">
-                <a16:creationId xmlns:a16="http://schemas.microsoft.com/office/drawing/2014/main" id="{B932200F-2D47-06F6-0141-CAB7369F47B1}"/>
+              <a:t>Connector</a:t>
+            </a:r>
+          </a:p>
+          <a:p>
+            <a:pPr algn="ctr"/>
+            <a:endParaRPr lang="en-US" dirty="0"/>
+          </a:p>
+          <a:p>
+            <a:pPr algn="ctr"/>
+            <a:endParaRPr lang="en-US" dirty="0"/>
+          </a:p>
+          <a:p>
+            <a:pPr algn="ctr"/>
+            <a:endParaRPr lang="en-US" dirty="0"/>
+          </a:p>
+          <a:p>
+            <a:pPr algn="ctr"/>
+            <a:endParaRPr lang="en-US" dirty="0"/>
+          </a:p>
+          <a:p>
+            <a:pPr algn="ctr"/>
+            <a:endParaRPr lang="en-US" dirty="0"/>
+          </a:p>
+        </p:txBody>
+      </p:sp>
+      <p:sp>
+        <p:nvSpPr>
+          <p:cNvPr id="4" name="Rectangle 3">
+            <a:extLst>
+              <a:ext uri="{FF2B5EF4-FFF2-40B4-BE49-F238E27FC236}">
+                <a16:creationId xmlns:a16="http://schemas.microsoft.com/office/drawing/2014/main" id="{50BD0FF2-14C0-B769-4A9B-8342386C3B83}"/>
               </a:ext>
             </a:extLst>
           </p:cNvPr>
@@ -4822,10 +4869,10 @@
         </p:nvSpPr>
         <p:spPr>
           <a:xfrm>
-            <a:off x="2423886" y="5442857"/>
-            <a:ext cx="711200" cy="551543"/>
-          </a:xfrm>
-          <a:prstGeom prst="can">
+            <a:off x="1654629" y="3614304"/>
+            <a:ext cx="9158509" cy="1084881"/>
+          </a:xfrm>
+          <a:prstGeom prst="rect">
             <a:avLst/>
           </a:prstGeom>
         </p:spPr>
@@ -4851,6 +4898,166 @@
           <a:p>
             <a:pPr algn="ctr"/>
             <a:r>
+              <a:rPr lang="en-US" dirty="0"/>
+              <a:t>File storage</a:t>
+            </a:r>
+          </a:p>
+        </p:txBody>
+      </p:sp>
+      <p:cxnSp>
+        <p:nvCxnSpPr>
+          <p:cNvPr id="10" name="Straight Arrow Connector 9">
+            <a:extLst>
+              <a:ext uri="{FF2B5EF4-FFF2-40B4-BE49-F238E27FC236}">
+                <a16:creationId xmlns:a16="http://schemas.microsoft.com/office/drawing/2014/main" id="{9DDDE992-1C60-E352-BB2C-56F4FADAE985}"/>
+              </a:ext>
+            </a:extLst>
+          </p:cNvPr>
+          <p:cNvCxnSpPr>
+            <a:cxnSpLocks/>
+          </p:cNvCxnSpPr>
+          <p:nvPr/>
+        </p:nvCxnSpPr>
+        <p:spPr>
+          <a:xfrm>
+            <a:off x="387626" y="3916018"/>
+            <a:ext cx="991237" cy="0"/>
+          </a:xfrm>
+          <a:prstGeom prst="straightConnector1">
+            <a:avLst/>
+          </a:prstGeom>
+          <a:ln w="38100">
+            <a:tailEnd type="triangle"/>
+          </a:ln>
+        </p:spPr>
+        <p:style>
+          <a:lnRef idx="1">
+            <a:schemeClr val="accent1"/>
+          </a:lnRef>
+          <a:fillRef idx="0">
+            <a:schemeClr val="accent1"/>
+          </a:fillRef>
+          <a:effectRef idx="0">
+            <a:schemeClr val="accent1"/>
+          </a:effectRef>
+          <a:fontRef idx="minor">
+            <a:schemeClr val="tx1"/>
+          </a:fontRef>
+        </p:style>
+      </p:cxnSp>
+      <p:sp>
+        <p:nvSpPr>
+          <p:cNvPr id="20" name="TextBox 19">
+            <a:extLst>
+              <a:ext uri="{FF2B5EF4-FFF2-40B4-BE49-F238E27FC236}">
+                <a16:creationId xmlns:a16="http://schemas.microsoft.com/office/drawing/2014/main" id="{96606B8C-7471-4670-BC2F-5D74357675CE}"/>
+              </a:ext>
+            </a:extLst>
+          </p:cNvPr>
+          <p:cNvSpPr txBox="1"/>
+          <p:nvPr/>
+        </p:nvSpPr>
+        <p:spPr>
+          <a:xfrm>
+            <a:off x="-64110" y="3429638"/>
+            <a:ext cx="1506695" cy="369332"/>
+          </a:xfrm>
+          <a:prstGeom prst="rect">
+            <a:avLst/>
+          </a:prstGeom>
+          <a:noFill/>
+        </p:spPr>
+        <p:txBody>
+          <a:bodyPr wrap="none" rtlCol="0">
+            <a:spAutoFit/>
+          </a:bodyPr>
+          <a:lstStyle/>
+          <a:p>
+            <a:r>
+              <a:rPr lang="en-US" dirty="0"/>
+              <a:t>File Reference</a:t>
+            </a:r>
+          </a:p>
+        </p:txBody>
+      </p:sp>
+      <p:sp>
+        <p:nvSpPr>
+          <p:cNvPr id="3" name="TextBox 2">
+            <a:extLst>
+              <a:ext uri="{FF2B5EF4-FFF2-40B4-BE49-F238E27FC236}">
+                <a16:creationId xmlns:a16="http://schemas.microsoft.com/office/drawing/2014/main" id="{186FAF21-AAF6-2794-6877-CEDD574F3324}"/>
+              </a:ext>
+            </a:extLst>
+          </p:cNvPr>
+          <p:cNvSpPr txBox="1"/>
+          <p:nvPr/>
+        </p:nvSpPr>
+        <p:spPr>
+          <a:xfrm>
+            <a:off x="4211925" y="787401"/>
+            <a:ext cx="2667462" cy="707886"/>
+          </a:xfrm>
+          <a:prstGeom prst="rect">
+            <a:avLst/>
+          </a:prstGeom>
+          <a:noFill/>
+        </p:spPr>
+        <p:txBody>
+          <a:bodyPr wrap="none" rtlCol="0">
+            <a:spAutoFit/>
+          </a:bodyPr>
+          <a:lstStyle/>
+          <a:p>
+            <a:r>
+              <a:rPr lang="en-US" sz="4000" dirty="0"/>
+              <a:t>Delete a file</a:t>
+            </a:r>
+          </a:p>
+        </p:txBody>
+      </p:sp>
+      <p:sp>
+        <p:nvSpPr>
+          <p:cNvPr id="5" name="Cylinder 4">
+            <a:extLst>
+              <a:ext uri="{FF2B5EF4-FFF2-40B4-BE49-F238E27FC236}">
+                <a16:creationId xmlns:a16="http://schemas.microsoft.com/office/drawing/2014/main" id="{2F7E8FAE-BE57-0E5B-27BD-FBECC912BBAD}"/>
+              </a:ext>
+            </a:extLst>
+          </p:cNvPr>
+          <p:cNvSpPr/>
+          <p:nvPr/>
+        </p:nvSpPr>
+        <p:spPr>
+          <a:xfrm>
+            <a:off x="1181494" y="5442857"/>
+            <a:ext cx="711200" cy="551543"/>
+          </a:xfrm>
+          <a:prstGeom prst="can">
+            <a:avLst/>
+          </a:prstGeom>
+        </p:spPr>
+        <p:style>
+          <a:lnRef idx="2">
+            <a:schemeClr val="accent1">
+              <a:shade val="15000"/>
+            </a:schemeClr>
+          </a:lnRef>
+          <a:fillRef idx="1">
+            <a:schemeClr val="accent1"/>
+          </a:fillRef>
+          <a:effectRef idx="0">
+            <a:schemeClr val="accent1"/>
+          </a:effectRef>
+          <a:fontRef idx="minor">
+            <a:schemeClr val="lt1"/>
+          </a:fontRef>
+        </p:style>
+        <p:txBody>
+          <a:bodyPr rtlCol="0" anchor="ctr"/>
+          <a:lstStyle/>
+          <a:p>
+            <a:pPr algn="ctr"/>
+            <a:r>
               <a:rPr lang="en-US" sz="1200" dirty="0"/>
               <a:t>CMIS</a:t>
             </a:r>
@@ -4859,10 +5066,10 @@
       </p:sp>
       <p:pic>
         <p:nvPicPr>
-          <p:cNvPr id="9" name="Picture 2" descr="json Vector Icons free download in SVG, PNG Format">
-            <a:extLst>
-              <a:ext uri="{FF2B5EF4-FFF2-40B4-BE49-F238E27FC236}">
-                <a16:creationId xmlns:a16="http://schemas.microsoft.com/office/drawing/2014/main" id="{7D488628-DDBC-C9F1-9894-8280A88E7514}"/>
+          <p:cNvPr id="6" name="Picture 2" descr="json Vector Icons free download in SVG, PNG Format">
+            <a:extLst>
+              <a:ext uri="{FF2B5EF4-FFF2-40B4-BE49-F238E27FC236}">
+                <a16:creationId xmlns:a16="http://schemas.microsoft.com/office/drawing/2014/main" id="{365C93E0-F343-E8D3-ACFB-BF96186EEEFF}"/>
               </a:ext>
             </a:extLst>
           </p:cNvPr>
@@ -4872,7 +5079,7 @@
           <p:nvPr/>
         </p:nvPicPr>
         <p:blipFill>
-          <a:blip r:embed="rId3">
+          <a:blip r:embed="rId2">
             <a:extLst>
               <a:ext uri="{28A0092B-C50C-407E-A947-70E740481C1C}">
                 <a14:useLocalDpi xmlns:a14="http://schemas.microsoft.com/office/drawing/2010/main" val="0"/>
@@ -4886,7 +5093,7 @@
         </p:blipFill>
         <p:spPr bwMode="auto">
           <a:xfrm flipV="1">
-            <a:off x="3856324" y="5346126"/>
+            <a:off x="2613932" y="5346126"/>
             <a:ext cx="711201" cy="711201"/>
           </a:xfrm>
           <a:prstGeom prst="rect">
@@ -4906,10 +5113,10 @@
       </p:pic>
       <p:pic>
         <p:nvPicPr>
-          <p:cNvPr id="11" name="Picture 4" descr="Free Folder SVG, PNG Icon, Symbol. Download Image.">
-            <a:extLst>
-              <a:ext uri="{FF2B5EF4-FFF2-40B4-BE49-F238E27FC236}">
-                <a16:creationId xmlns:a16="http://schemas.microsoft.com/office/drawing/2014/main" id="{580F4BDC-1D3F-2CE6-A522-61DB193F78C1}"/>
+          <p:cNvPr id="12" name="Picture 4" descr="Free Folder SVG, PNG Icon, Symbol. Download Image.">
+            <a:extLst>
+              <a:ext uri="{FF2B5EF4-FFF2-40B4-BE49-F238E27FC236}">
+                <a16:creationId xmlns:a16="http://schemas.microsoft.com/office/drawing/2014/main" id="{D8BD6F08-3474-F07C-2E68-62FF022B9410}"/>
               </a:ext>
             </a:extLst>
           </p:cNvPr>
@@ -4919,7 +5126,7 @@
           <p:nvPr/>
         </p:nvPicPr>
         <p:blipFill>
-          <a:blip r:embed="rId4">
+          <a:blip r:embed="rId3">
             <a:extLst>
               <a:ext uri="{28A0092B-C50C-407E-A947-70E740481C1C}">
                 <a14:useLocalDpi xmlns:a14="http://schemas.microsoft.com/office/drawing/2010/main" val="0"/>
@@ -4933,7 +5140,7 @@
         </p:blipFill>
         <p:spPr bwMode="auto">
           <a:xfrm>
-            <a:off x="5624287" y="5208235"/>
+            <a:off x="4381895" y="5208235"/>
             <a:ext cx="943426" cy="943426"/>
           </a:xfrm>
           <a:prstGeom prst="rect">
@@ -4953,10 +5160,10 @@
       </p:pic>
       <p:pic>
         <p:nvPicPr>
-          <p:cNvPr id="13" name="Picture 6" descr="Folder Dossier Temps SZ icon">
-            <a:extLst>
-              <a:ext uri="{FF2B5EF4-FFF2-40B4-BE49-F238E27FC236}">
-                <a16:creationId xmlns:a16="http://schemas.microsoft.com/office/drawing/2014/main" id="{32394103-C800-5780-76DC-35C654571FF7}"/>
+          <p:cNvPr id="15" name="Picture 6" descr="Folder Dossier Temps SZ icon">
+            <a:extLst>
+              <a:ext uri="{FF2B5EF4-FFF2-40B4-BE49-F238E27FC236}">
+                <a16:creationId xmlns:a16="http://schemas.microsoft.com/office/drawing/2014/main" id="{05C5A3CD-A309-F977-2D53-DECD35E93991}"/>
               </a:ext>
             </a:extLst>
           </p:cNvPr>
@@ -4966,7 +5173,7 @@
           <p:nvPr/>
         </p:nvPicPr>
         <p:blipFill>
-          <a:blip r:embed="rId5">
+          <a:blip r:embed="rId4">
             <a:extLst>
               <a:ext uri="{28A0092B-C50C-407E-A947-70E740481C1C}">
                 <a14:useLocalDpi xmlns:a14="http://schemas.microsoft.com/office/drawing/2010/main" val="0"/>
@@ -4980,7 +5187,7 @@
         </p:blipFill>
         <p:spPr bwMode="auto">
           <a:xfrm>
-            <a:off x="7902528" y="5145496"/>
+            <a:off x="6660136" y="5145496"/>
             <a:ext cx="1084882" cy="1084882"/>
           </a:xfrm>
           <a:prstGeom prst="rect">
@@ -5000,10 +5207,10 @@
       </p:pic>
       <p:sp>
         <p:nvSpPr>
-          <p:cNvPr id="14" name="TextBox 13">
-            <a:extLst>
-              <a:ext uri="{FF2B5EF4-FFF2-40B4-BE49-F238E27FC236}">
-                <a16:creationId xmlns:a16="http://schemas.microsoft.com/office/drawing/2014/main" id="{934B998F-563B-BE8F-D8CD-5E7F19980285}"/>
+          <p:cNvPr id="16" name="TextBox 15">
+            <a:extLst>
+              <a:ext uri="{FF2B5EF4-FFF2-40B4-BE49-F238E27FC236}">
+                <a16:creationId xmlns:a16="http://schemas.microsoft.com/office/drawing/2014/main" id="{4F03D8EF-64DE-8A93-2E64-FCC2969DEB26}"/>
               </a:ext>
             </a:extLst>
           </p:cNvPr>
@@ -5012,8 +5219,8 @@
         </p:nvSpPr>
         <p:spPr>
           <a:xfrm>
-            <a:off x="2119086" y="6440711"/>
-            <a:ext cx="8864927" cy="369332"/>
+            <a:off x="922682" y="6344060"/>
+            <a:ext cx="9354379" cy="369332"/>
           </a:xfrm>
           <a:prstGeom prst="rect">
             <a:avLst/>
@@ -5021,22 +5228,993 @@
           <a:noFill/>
         </p:spPr>
         <p:txBody>
-          <a:bodyPr wrap="none" rtlCol="0">
+          <a:bodyPr wrap="square" rtlCol="0">
             <a:spAutoFit/>
           </a:bodyPr>
           <a:lstStyle/>
           <a:p>
             <a:r>
               <a:rPr lang="en-US" dirty="0"/>
-              <a:t>     CMIS		JSON		Folder		Temporary folder		URL</a:t>
-            </a:r>
-          </a:p>
-        </p:txBody>
-      </p:sp>
+              <a:t>     CMIS		JSON		Folder		Temporary folder	 Camunda 8 Doc</a:t>
+            </a:r>
+          </a:p>
+        </p:txBody>
+      </p:sp>
+      <p:pic>
+        <p:nvPicPr>
+          <p:cNvPr id="17" name="Picture 16">
+            <a:extLst>
+              <a:ext uri="{FF2B5EF4-FFF2-40B4-BE49-F238E27FC236}">
+                <a16:creationId xmlns:a16="http://schemas.microsoft.com/office/drawing/2014/main" id="{6B6FB22A-D5BA-5EF5-2B75-6B0B7091D9E5}"/>
+              </a:ext>
+            </a:extLst>
+          </p:cNvPr>
+          <p:cNvPicPr>
+            <a:picLocks noChangeAspect="1"/>
+          </p:cNvPicPr>
+          <p:nvPr/>
+        </p:nvPicPr>
+        <p:blipFill>
+          <a:blip r:embed="rId5"/>
+          <a:stretch>
+            <a:fillRect/>
+          </a:stretch>
+        </p:blipFill>
+        <p:spPr>
+          <a:xfrm>
+            <a:off x="8336858" y="5547265"/>
+            <a:ext cx="1018095" cy="342725"/>
+          </a:xfrm>
+          <a:prstGeom prst="rect">
+            <a:avLst/>
+          </a:prstGeom>
+        </p:spPr>
+      </p:pic>
     </p:spTree>
     <p:extLst>
       <p:ext uri="{BB962C8B-B14F-4D97-AF65-F5344CB8AC3E}">
         <p14:creationId xmlns:p14="http://schemas.microsoft.com/office/powerpoint/2010/main" val="2921029532"/>
+      </p:ext>
+    </p:extLst>
+  </p:cSld>
+  <p:clrMapOvr>
+    <a:masterClrMapping/>
+  </p:clrMapOvr>
+</p:sld>
+</file>
+
+<file path=ppt/slides/slide4.xml><?xml version="1.0" encoding="utf-8"?>
+<p:sld xmlns:a="http://schemas.openxmlformats.org/drawingml/2006/main" xmlns:r="http://schemas.openxmlformats.org/officeDocument/2006/relationships" xmlns:p="http://schemas.openxmlformats.org/presentationml/2006/main">
+  <p:cSld>
+    <p:spTree>
+      <p:nvGrpSpPr>
+        <p:cNvPr id="1" name="">
+          <a:extLst>
+            <a:ext uri="{FF2B5EF4-FFF2-40B4-BE49-F238E27FC236}">
+              <a16:creationId xmlns:a16="http://schemas.microsoft.com/office/drawing/2014/main" id="{553B7FE3-D463-86F2-3AD2-1E4813EB4C54}"/>
+            </a:ext>
+          </a:extLst>
+        </p:cNvPr>
+        <p:cNvGrpSpPr/>
+        <p:nvPr/>
+      </p:nvGrpSpPr>
+      <p:grpSpPr>
+        <a:xfrm>
+          <a:off x="0" y="0"/>
+          <a:ext cx="0" cy="0"/>
+          <a:chOff x="0" y="0"/>
+          <a:chExt cx="0" cy="0"/>
+        </a:xfrm>
+      </p:grpSpPr>
+      <p:sp>
+        <p:nvSpPr>
+          <p:cNvPr id="7" name="Rectangle 6">
+            <a:extLst>
+              <a:ext uri="{FF2B5EF4-FFF2-40B4-BE49-F238E27FC236}">
+                <a16:creationId xmlns:a16="http://schemas.microsoft.com/office/drawing/2014/main" id="{08A4B796-A285-2F61-EEF1-8696D1A0BD54}"/>
+              </a:ext>
+            </a:extLst>
+          </p:cNvPr>
+          <p:cNvSpPr/>
+          <p:nvPr/>
+        </p:nvSpPr>
+        <p:spPr>
+          <a:xfrm>
+            <a:off x="2248971" y="3079476"/>
+            <a:ext cx="8087725" cy="2467579"/>
+          </a:xfrm>
+          <a:prstGeom prst="rect">
+            <a:avLst/>
+          </a:prstGeom>
+          <a:solidFill>
+            <a:schemeClr val="accent6">
+              <a:lumMod val="60000"/>
+              <a:lumOff val="40000"/>
+            </a:schemeClr>
+          </a:solidFill>
+        </p:spPr>
+        <p:style>
+          <a:lnRef idx="2">
+            <a:schemeClr val="accent1">
+              <a:shade val="15000"/>
+            </a:schemeClr>
+          </a:lnRef>
+          <a:fillRef idx="1">
+            <a:schemeClr val="accent1"/>
+          </a:fillRef>
+          <a:effectRef idx="0">
+            <a:schemeClr val="accent1"/>
+          </a:effectRef>
+          <a:fontRef idx="minor">
+            <a:schemeClr val="lt1"/>
+          </a:fontRef>
+        </p:style>
+        <p:txBody>
+          <a:bodyPr rtlCol="0" anchor="ctr"/>
+          <a:lstStyle/>
+          <a:p>
+            <a:pPr algn="ctr"/>
+            <a:r>
+              <a:rPr lang="en-US" dirty="0"/>
+              <a:t>File storage</a:t>
+            </a:r>
+          </a:p>
+        </p:txBody>
+      </p:sp>
+      <p:sp>
+        <p:nvSpPr>
+          <p:cNvPr id="4" name="Rectangle 3">
+            <a:extLst>
+              <a:ext uri="{FF2B5EF4-FFF2-40B4-BE49-F238E27FC236}">
+                <a16:creationId xmlns:a16="http://schemas.microsoft.com/office/drawing/2014/main" id="{223C70C3-672A-7EFA-7AE5-71C84D8569DF}"/>
+              </a:ext>
+            </a:extLst>
+          </p:cNvPr>
+          <p:cNvSpPr/>
+          <p:nvPr/>
+        </p:nvSpPr>
+        <p:spPr>
+          <a:xfrm>
+            <a:off x="2423885" y="4615502"/>
+            <a:ext cx="7814773" cy="677759"/>
+          </a:xfrm>
+          <a:prstGeom prst="rect">
+            <a:avLst/>
+          </a:prstGeom>
+        </p:spPr>
+        <p:style>
+          <a:lnRef idx="2">
+            <a:schemeClr val="accent1">
+              <a:shade val="15000"/>
+            </a:schemeClr>
+          </a:lnRef>
+          <a:fillRef idx="1">
+            <a:schemeClr val="accent1"/>
+          </a:fillRef>
+          <a:effectRef idx="0">
+            <a:schemeClr val="accent1"/>
+          </a:effectRef>
+          <a:fontRef idx="minor">
+            <a:schemeClr val="lt1"/>
+          </a:fontRef>
+        </p:style>
+        <p:txBody>
+          <a:bodyPr rtlCol="0" anchor="ctr"/>
+          <a:lstStyle/>
+          <a:p>
+            <a:pPr algn="ctr"/>
+            <a:r>
+              <a:rPr lang="en-US" dirty="0"/>
+              <a:t>Destination File storage</a:t>
+            </a:r>
+          </a:p>
+        </p:txBody>
+      </p:sp>
+      <p:sp>
+        <p:nvSpPr>
+          <p:cNvPr id="5" name="Cylinder 4">
+            <a:extLst>
+              <a:ext uri="{FF2B5EF4-FFF2-40B4-BE49-F238E27FC236}">
+                <a16:creationId xmlns:a16="http://schemas.microsoft.com/office/drawing/2014/main" id="{1335178B-BEC4-C1D7-5FFD-B6AE53E76A08}"/>
+              </a:ext>
+            </a:extLst>
+          </p:cNvPr>
+          <p:cNvSpPr/>
+          <p:nvPr/>
+        </p:nvSpPr>
+        <p:spPr>
+          <a:xfrm>
+            <a:off x="2423886" y="5807760"/>
+            <a:ext cx="711200" cy="551543"/>
+          </a:xfrm>
+          <a:prstGeom prst="can">
+            <a:avLst/>
+          </a:prstGeom>
+        </p:spPr>
+        <p:style>
+          <a:lnRef idx="2">
+            <a:schemeClr val="accent1">
+              <a:shade val="15000"/>
+            </a:schemeClr>
+          </a:lnRef>
+          <a:fillRef idx="1">
+            <a:schemeClr val="accent1"/>
+          </a:fillRef>
+          <a:effectRef idx="0">
+            <a:schemeClr val="accent1"/>
+          </a:effectRef>
+          <a:fontRef idx="minor">
+            <a:schemeClr val="lt1"/>
+          </a:fontRef>
+        </p:style>
+        <p:txBody>
+          <a:bodyPr rtlCol="0" anchor="ctr"/>
+          <a:lstStyle/>
+          <a:p>
+            <a:pPr algn="ctr"/>
+            <a:r>
+              <a:rPr lang="en-US" sz="1200" dirty="0"/>
+              <a:t>CMIS</a:t>
+            </a:r>
+          </a:p>
+        </p:txBody>
+      </p:sp>
+      <p:cxnSp>
+        <p:nvCxnSpPr>
+          <p:cNvPr id="10" name="Straight Arrow Connector 9">
+            <a:extLst>
+              <a:ext uri="{FF2B5EF4-FFF2-40B4-BE49-F238E27FC236}">
+                <a16:creationId xmlns:a16="http://schemas.microsoft.com/office/drawing/2014/main" id="{661B264A-4B12-362C-3D68-494A78151FE1}"/>
+              </a:ext>
+            </a:extLst>
+          </p:cNvPr>
+          <p:cNvCxnSpPr>
+            <a:cxnSpLocks/>
+            <a:endCxn id="7" idx="1"/>
+          </p:cNvCxnSpPr>
+          <p:nvPr/>
+        </p:nvCxnSpPr>
+        <p:spPr>
+          <a:xfrm>
+            <a:off x="248478" y="4313266"/>
+            <a:ext cx="2000493" cy="0"/>
+          </a:xfrm>
+          <a:prstGeom prst="straightConnector1">
+            <a:avLst/>
+          </a:prstGeom>
+          <a:ln w="38100">
+            <a:tailEnd type="triangle"/>
+          </a:ln>
+        </p:spPr>
+        <p:style>
+          <a:lnRef idx="1">
+            <a:schemeClr val="accent1"/>
+          </a:lnRef>
+          <a:fillRef idx="0">
+            <a:schemeClr val="accent1"/>
+          </a:fillRef>
+          <a:effectRef idx="0">
+            <a:schemeClr val="accent1"/>
+          </a:effectRef>
+          <a:fontRef idx="minor">
+            <a:schemeClr val="tx1"/>
+          </a:fontRef>
+        </p:style>
+      </p:cxnSp>
+      <p:pic>
+        <p:nvPicPr>
+          <p:cNvPr id="1026" name="Picture 2" descr="json Vector Icons free download in SVG, PNG Format">
+            <a:extLst>
+              <a:ext uri="{FF2B5EF4-FFF2-40B4-BE49-F238E27FC236}">
+                <a16:creationId xmlns:a16="http://schemas.microsoft.com/office/drawing/2014/main" id="{8B583E72-C5F0-AD3C-995C-08039C48058E}"/>
+              </a:ext>
+            </a:extLst>
+          </p:cNvPr>
+          <p:cNvPicPr>
+            <a:picLocks noChangeAspect="1" noChangeArrowheads="1"/>
+          </p:cNvPicPr>
+          <p:nvPr/>
+        </p:nvPicPr>
+        <p:blipFill>
+          <a:blip r:embed="rId2">
+            <a:extLst>
+              <a:ext uri="{28A0092B-C50C-407E-A947-70E740481C1C}">
+                <a14:useLocalDpi xmlns:a14="http://schemas.microsoft.com/office/drawing/2010/main" val="0"/>
+              </a:ext>
+            </a:extLst>
+          </a:blip>
+          <a:srcRect/>
+          <a:stretch>
+            <a:fillRect/>
+          </a:stretch>
+        </p:blipFill>
+        <p:spPr bwMode="auto">
+          <a:xfrm flipV="1">
+            <a:off x="3856324" y="5711029"/>
+            <a:ext cx="711201" cy="711201"/>
+          </a:xfrm>
+          <a:prstGeom prst="rect">
+            <a:avLst/>
+          </a:prstGeom>
+          <a:noFill/>
+          <a:extLst>
+            <a:ext uri="{909E8E84-426E-40DD-AFC4-6F175D3DCCD1}">
+              <a14:hiddenFill xmlns:a14="http://schemas.microsoft.com/office/drawing/2010/main">
+                <a:solidFill>
+                  <a:srgbClr val="FFFFFF"/>
+                </a:solidFill>
+              </a14:hiddenFill>
+            </a:ext>
+          </a:extLst>
+        </p:spPr>
+      </p:pic>
+      <p:pic>
+        <p:nvPicPr>
+          <p:cNvPr id="1028" name="Picture 4" descr="Free Folder SVG, PNG Icon, Symbol. Download Image.">
+            <a:extLst>
+              <a:ext uri="{FF2B5EF4-FFF2-40B4-BE49-F238E27FC236}">
+                <a16:creationId xmlns:a16="http://schemas.microsoft.com/office/drawing/2014/main" id="{5C27B306-63AD-9A2A-0C65-8A4040639B6F}"/>
+              </a:ext>
+            </a:extLst>
+          </p:cNvPr>
+          <p:cNvPicPr>
+            <a:picLocks noChangeAspect="1" noChangeArrowheads="1"/>
+          </p:cNvPicPr>
+          <p:nvPr/>
+        </p:nvPicPr>
+        <p:blipFill>
+          <a:blip r:embed="rId3">
+            <a:extLst>
+              <a:ext uri="{28A0092B-C50C-407E-A947-70E740481C1C}">
+                <a14:useLocalDpi xmlns:a14="http://schemas.microsoft.com/office/drawing/2010/main" val="0"/>
+              </a:ext>
+            </a:extLst>
+          </a:blip>
+          <a:srcRect/>
+          <a:stretch>
+            <a:fillRect/>
+          </a:stretch>
+        </p:blipFill>
+        <p:spPr bwMode="auto">
+          <a:xfrm>
+            <a:off x="5624287" y="5573138"/>
+            <a:ext cx="943426" cy="943426"/>
+          </a:xfrm>
+          <a:prstGeom prst="rect">
+            <a:avLst/>
+          </a:prstGeom>
+          <a:noFill/>
+          <a:extLst>
+            <a:ext uri="{909E8E84-426E-40DD-AFC4-6F175D3DCCD1}">
+              <a14:hiddenFill xmlns:a14="http://schemas.microsoft.com/office/drawing/2010/main">
+                <a:solidFill>
+                  <a:srgbClr val="FFFFFF"/>
+                </a:solidFill>
+              </a14:hiddenFill>
+            </a:ext>
+          </a:extLst>
+        </p:spPr>
+      </p:pic>
+      <p:pic>
+        <p:nvPicPr>
+          <p:cNvPr id="1030" name="Picture 6" descr="Folder Dossier Temps SZ icon">
+            <a:extLst>
+              <a:ext uri="{FF2B5EF4-FFF2-40B4-BE49-F238E27FC236}">
+                <a16:creationId xmlns:a16="http://schemas.microsoft.com/office/drawing/2014/main" id="{527B48FB-B5C5-CE80-BCAC-1363068CA161}"/>
+              </a:ext>
+            </a:extLst>
+          </p:cNvPr>
+          <p:cNvPicPr>
+            <a:picLocks noChangeAspect="1" noChangeArrowheads="1"/>
+          </p:cNvPicPr>
+          <p:nvPr/>
+        </p:nvPicPr>
+        <p:blipFill>
+          <a:blip r:embed="rId4">
+            <a:extLst>
+              <a:ext uri="{28A0092B-C50C-407E-A947-70E740481C1C}">
+                <a14:useLocalDpi xmlns:a14="http://schemas.microsoft.com/office/drawing/2010/main" val="0"/>
+              </a:ext>
+            </a:extLst>
+          </a:blip>
+          <a:srcRect/>
+          <a:stretch>
+            <a:fillRect/>
+          </a:stretch>
+        </p:blipFill>
+        <p:spPr bwMode="auto">
+          <a:xfrm>
+            <a:off x="7902528" y="5510399"/>
+            <a:ext cx="1084882" cy="1084882"/>
+          </a:xfrm>
+          <a:prstGeom prst="rect">
+            <a:avLst/>
+          </a:prstGeom>
+          <a:noFill/>
+          <a:extLst>
+            <a:ext uri="{909E8E84-426E-40DD-AFC4-6F175D3DCCD1}">
+              <a14:hiddenFill xmlns:a14="http://schemas.microsoft.com/office/drawing/2010/main">
+                <a:solidFill>
+                  <a:srgbClr val="FFFFFF"/>
+                </a:solidFill>
+              </a14:hiddenFill>
+            </a:ext>
+          </a:extLst>
+        </p:spPr>
+      </p:pic>
+      <p:sp>
+        <p:nvSpPr>
+          <p:cNvPr id="12" name="TextBox 11">
+            <a:extLst>
+              <a:ext uri="{FF2B5EF4-FFF2-40B4-BE49-F238E27FC236}">
+                <a16:creationId xmlns:a16="http://schemas.microsoft.com/office/drawing/2014/main" id="{40C45A44-A24C-A9BB-D0A1-1E5B21A9657B}"/>
+              </a:ext>
+            </a:extLst>
+          </p:cNvPr>
+          <p:cNvSpPr txBox="1"/>
+          <p:nvPr/>
+        </p:nvSpPr>
+        <p:spPr>
+          <a:xfrm>
+            <a:off x="2099207" y="6541119"/>
+            <a:ext cx="9456307" cy="369332"/>
+          </a:xfrm>
+          <a:prstGeom prst="rect">
+            <a:avLst/>
+          </a:prstGeom>
+          <a:noFill/>
+        </p:spPr>
+        <p:txBody>
+          <a:bodyPr wrap="none" rtlCol="0">
+            <a:spAutoFit/>
+          </a:bodyPr>
+          <a:lstStyle/>
+          <a:p>
+            <a:r>
+              <a:rPr lang="en-US" dirty="0"/>
+              <a:t>     CMIS		JSON		Folder		Temporary folder             Camunda 8 Doc</a:t>
+            </a:r>
+          </a:p>
+        </p:txBody>
+      </p:sp>
+      <p:cxnSp>
+        <p:nvCxnSpPr>
+          <p:cNvPr id="15" name="Straight Arrow Connector 14">
+            <a:extLst>
+              <a:ext uri="{FF2B5EF4-FFF2-40B4-BE49-F238E27FC236}">
+                <a16:creationId xmlns:a16="http://schemas.microsoft.com/office/drawing/2014/main" id="{0DFE1856-470D-22D9-0340-E94883C8D3D7}"/>
+              </a:ext>
+            </a:extLst>
+          </p:cNvPr>
+          <p:cNvCxnSpPr>
+            <a:cxnSpLocks/>
+            <a:stCxn id="7" idx="3"/>
+          </p:cNvCxnSpPr>
+          <p:nvPr/>
+        </p:nvCxnSpPr>
+        <p:spPr>
+          <a:xfrm flipV="1">
+            <a:off x="10336696" y="4313265"/>
+            <a:ext cx="1303421" cy="1"/>
+          </a:xfrm>
+          <a:prstGeom prst="straightConnector1">
+            <a:avLst/>
+          </a:prstGeom>
+          <a:ln w="38100">
+            <a:tailEnd type="triangle"/>
+          </a:ln>
+        </p:spPr>
+        <p:style>
+          <a:lnRef idx="1">
+            <a:schemeClr val="accent1"/>
+          </a:lnRef>
+          <a:fillRef idx="0">
+            <a:schemeClr val="accent1"/>
+          </a:fillRef>
+          <a:effectRef idx="0">
+            <a:schemeClr val="accent1"/>
+          </a:effectRef>
+          <a:fontRef idx="minor">
+            <a:schemeClr val="tx1"/>
+          </a:fontRef>
+        </p:style>
+      </p:cxnSp>
+      <p:sp>
+        <p:nvSpPr>
+          <p:cNvPr id="20" name="TextBox 19">
+            <a:extLst>
+              <a:ext uri="{FF2B5EF4-FFF2-40B4-BE49-F238E27FC236}">
+                <a16:creationId xmlns:a16="http://schemas.microsoft.com/office/drawing/2014/main" id="{EAC02010-1E9A-5AB6-2EDF-3C13982336AD}"/>
+              </a:ext>
+            </a:extLst>
+          </p:cNvPr>
+          <p:cNvSpPr txBox="1"/>
+          <p:nvPr/>
+        </p:nvSpPr>
+        <p:spPr>
+          <a:xfrm>
+            <a:off x="10300618" y="3894310"/>
+            <a:ext cx="1981825" cy="369332"/>
+          </a:xfrm>
+          <a:prstGeom prst="rect">
+            <a:avLst/>
+          </a:prstGeom>
+          <a:noFill/>
+        </p:spPr>
+        <p:txBody>
+          <a:bodyPr wrap="none" rtlCol="0">
+            <a:spAutoFit/>
+          </a:bodyPr>
+          <a:lstStyle/>
+          <a:p>
+            <a:r>
+              <a:rPr lang="en-US" dirty="0"/>
+              <a:t>Dest File Reference</a:t>
+            </a:r>
+          </a:p>
+        </p:txBody>
+      </p:sp>
+      <p:sp>
+        <p:nvSpPr>
+          <p:cNvPr id="23" name="TextBox 22">
+            <a:extLst>
+              <a:ext uri="{FF2B5EF4-FFF2-40B4-BE49-F238E27FC236}">
+                <a16:creationId xmlns:a16="http://schemas.microsoft.com/office/drawing/2014/main" id="{33B0D9A5-D917-E17A-5578-A9F02C2D208E}"/>
+              </a:ext>
+            </a:extLst>
+          </p:cNvPr>
+          <p:cNvSpPr txBox="1"/>
+          <p:nvPr/>
+        </p:nvSpPr>
+        <p:spPr>
+          <a:xfrm>
+            <a:off x="4211925" y="787401"/>
+            <a:ext cx="2351028" cy="707886"/>
+          </a:xfrm>
+          <a:prstGeom prst="rect">
+            <a:avLst/>
+          </a:prstGeom>
+          <a:noFill/>
+        </p:spPr>
+        <p:txBody>
+          <a:bodyPr wrap="none" rtlCol="0">
+            <a:spAutoFit/>
+          </a:bodyPr>
+          <a:lstStyle/>
+          <a:p>
+            <a:r>
+              <a:rPr lang="en-US" sz="4000" dirty="0"/>
+              <a:t>Copy a file</a:t>
+            </a:r>
+          </a:p>
+        </p:txBody>
+      </p:sp>
+      <p:pic>
+        <p:nvPicPr>
+          <p:cNvPr id="13" name="Picture 12">
+            <a:extLst>
+              <a:ext uri="{FF2B5EF4-FFF2-40B4-BE49-F238E27FC236}">
+                <a16:creationId xmlns:a16="http://schemas.microsoft.com/office/drawing/2014/main" id="{EEFB688A-43CE-570C-504A-CB36EF4FE4FD}"/>
+              </a:ext>
+            </a:extLst>
+          </p:cNvPr>
+          <p:cNvPicPr>
+            <a:picLocks noChangeAspect="1"/>
+          </p:cNvPicPr>
+          <p:nvPr/>
+        </p:nvPicPr>
+        <p:blipFill>
+          <a:blip r:embed="rId5"/>
+          <a:stretch>
+            <a:fillRect/>
+          </a:stretch>
+        </p:blipFill>
+        <p:spPr>
+          <a:xfrm>
+            <a:off x="10078742" y="5964105"/>
+            <a:ext cx="1018095" cy="342725"/>
+          </a:xfrm>
+          <a:prstGeom prst="rect">
+            <a:avLst/>
+          </a:prstGeom>
+        </p:spPr>
+      </p:pic>
+      <p:sp>
+        <p:nvSpPr>
+          <p:cNvPr id="3" name="Rectangle 2">
+            <a:extLst>
+              <a:ext uri="{FF2B5EF4-FFF2-40B4-BE49-F238E27FC236}">
+                <a16:creationId xmlns:a16="http://schemas.microsoft.com/office/drawing/2014/main" id="{239E815B-4B4E-56E9-419A-60649A22BDFE}"/>
+              </a:ext>
+            </a:extLst>
+          </p:cNvPr>
+          <p:cNvSpPr/>
+          <p:nvPr/>
+        </p:nvSpPr>
+        <p:spPr>
+          <a:xfrm>
+            <a:off x="2423886" y="3411653"/>
+            <a:ext cx="7701817" cy="655497"/>
+          </a:xfrm>
+          <a:prstGeom prst="rect">
+            <a:avLst/>
+          </a:prstGeom>
+        </p:spPr>
+        <p:style>
+          <a:lnRef idx="2">
+            <a:schemeClr val="accent1">
+              <a:shade val="15000"/>
+            </a:schemeClr>
+          </a:lnRef>
+          <a:fillRef idx="1">
+            <a:schemeClr val="accent1"/>
+          </a:fillRef>
+          <a:effectRef idx="0">
+            <a:schemeClr val="accent1"/>
+          </a:effectRef>
+          <a:fontRef idx="minor">
+            <a:schemeClr val="lt1"/>
+          </a:fontRef>
+        </p:style>
+        <p:txBody>
+          <a:bodyPr rtlCol="0" anchor="ctr"/>
+          <a:lstStyle/>
+          <a:p>
+            <a:pPr algn="ctr"/>
+            <a:r>
+              <a:rPr lang="en-US" dirty="0"/>
+              <a:t>Source File storage</a:t>
+            </a:r>
+          </a:p>
+        </p:txBody>
+      </p:sp>
+      <p:pic>
+        <p:nvPicPr>
+          <p:cNvPr id="9" name="Picture 8" descr="Free Link Url vector and picture">
+            <a:extLst>
+              <a:ext uri="{FF2B5EF4-FFF2-40B4-BE49-F238E27FC236}">
+                <a16:creationId xmlns:a16="http://schemas.microsoft.com/office/drawing/2014/main" id="{0F36631B-49F9-498D-1D98-37E2A15FD566}"/>
+              </a:ext>
+            </a:extLst>
+          </p:cNvPr>
+          <p:cNvPicPr>
+            <a:picLocks noChangeAspect="1" noChangeArrowheads="1"/>
+          </p:cNvPicPr>
+          <p:nvPr/>
+        </p:nvPicPr>
+        <p:blipFill>
+          <a:blip r:embed="rId6">
+            <a:extLst>
+              <a:ext uri="{28A0092B-C50C-407E-A947-70E740481C1C}">
+                <a14:useLocalDpi xmlns:a14="http://schemas.microsoft.com/office/drawing/2010/main" val="0"/>
+              </a:ext>
+            </a:extLst>
+          </a:blip>
+          <a:srcRect/>
+          <a:stretch>
+            <a:fillRect/>
+          </a:stretch>
+        </p:blipFill>
+        <p:spPr bwMode="auto">
+          <a:xfrm>
+            <a:off x="10549855" y="1501275"/>
+            <a:ext cx="823992" cy="823992"/>
+          </a:xfrm>
+          <a:prstGeom prst="rect">
+            <a:avLst/>
+          </a:prstGeom>
+          <a:noFill/>
+          <a:extLst>
+            <a:ext uri="{909E8E84-426E-40DD-AFC4-6F175D3DCCD1}">
+              <a14:hiddenFill xmlns:a14="http://schemas.microsoft.com/office/drawing/2010/main">
+                <a:solidFill>
+                  <a:srgbClr val="FFFFFF"/>
+                </a:solidFill>
+              </a14:hiddenFill>
+            </a:ext>
+          </a:extLst>
+        </p:spPr>
+      </p:pic>
+      <p:sp>
+        <p:nvSpPr>
+          <p:cNvPr id="11" name="Cylinder 10">
+            <a:extLst>
+              <a:ext uri="{FF2B5EF4-FFF2-40B4-BE49-F238E27FC236}">
+                <a16:creationId xmlns:a16="http://schemas.microsoft.com/office/drawing/2014/main" id="{35D0D1B6-5528-2216-5D68-93965A8E6391}"/>
+              </a:ext>
+            </a:extLst>
+          </p:cNvPr>
+          <p:cNvSpPr/>
+          <p:nvPr/>
+        </p:nvSpPr>
+        <p:spPr>
+          <a:xfrm>
+            <a:off x="1597821" y="1598006"/>
+            <a:ext cx="711200" cy="551543"/>
+          </a:xfrm>
+          <a:prstGeom prst="can">
+            <a:avLst/>
+          </a:prstGeom>
+        </p:spPr>
+        <p:style>
+          <a:lnRef idx="2">
+            <a:schemeClr val="accent1">
+              <a:shade val="15000"/>
+            </a:schemeClr>
+          </a:lnRef>
+          <a:fillRef idx="1">
+            <a:schemeClr val="accent1"/>
+          </a:fillRef>
+          <a:effectRef idx="0">
+            <a:schemeClr val="accent1"/>
+          </a:effectRef>
+          <a:fontRef idx="minor">
+            <a:schemeClr val="lt1"/>
+          </a:fontRef>
+        </p:style>
+        <p:txBody>
+          <a:bodyPr rtlCol="0" anchor="ctr"/>
+          <a:lstStyle/>
+          <a:p>
+            <a:pPr algn="ctr"/>
+            <a:r>
+              <a:rPr lang="en-US" sz="1200" dirty="0"/>
+              <a:t>CMIS</a:t>
+            </a:r>
+          </a:p>
+        </p:txBody>
+      </p:sp>
+      <p:pic>
+        <p:nvPicPr>
+          <p:cNvPr id="14" name="Picture 2" descr="json Vector Icons free download in SVG, PNG Format">
+            <a:extLst>
+              <a:ext uri="{FF2B5EF4-FFF2-40B4-BE49-F238E27FC236}">
+                <a16:creationId xmlns:a16="http://schemas.microsoft.com/office/drawing/2014/main" id="{32F3DD71-DC96-D00E-576C-24EB3BBF0646}"/>
+              </a:ext>
+            </a:extLst>
+          </p:cNvPr>
+          <p:cNvPicPr>
+            <a:picLocks noChangeAspect="1" noChangeArrowheads="1"/>
+          </p:cNvPicPr>
+          <p:nvPr/>
+        </p:nvPicPr>
+        <p:blipFill>
+          <a:blip r:embed="rId2">
+            <a:extLst>
+              <a:ext uri="{28A0092B-C50C-407E-A947-70E740481C1C}">
+                <a14:useLocalDpi xmlns:a14="http://schemas.microsoft.com/office/drawing/2010/main" val="0"/>
+              </a:ext>
+            </a:extLst>
+          </a:blip>
+          <a:srcRect/>
+          <a:stretch>
+            <a:fillRect/>
+          </a:stretch>
+        </p:blipFill>
+        <p:spPr bwMode="auto">
+          <a:xfrm flipV="1">
+            <a:off x="3030259" y="1501275"/>
+            <a:ext cx="711201" cy="711201"/>
+          </a:xfrm>
+          <a:prstGeom prst="rect">
+            <a:avLst/>
+          </a:prstGeom>
+          <a:noFill/>
+          <a:extLst>
+            <a:ext uri="{909E8E84-426E-40DD-AFC4-6F175D3DCCD1}">
+              <a14:hiddenFill xmlns:a14="http://schemas.microsoft.com/office/drawing/2010/main">
+                <a:solidFill>
+                  <a:srgbClr val="FFFFFF"/>
+                </a:solidFill>
+              </a14:hiddenFill>
+            </a:ext>
+          </a:extLst>
+        </p:spPr>
+      </p:pic>
+      <p:pic>
+        <p:nvPicPr>
+          <p:cNvPr id="16" name="Picture 4" descr="Free Folder SVG, PNG Icon, Symbol. Download Image.">
+            <a:extLst>
+              <a:ext uri="{FF2B5EF4-FFF2-40B4-BE49-F238E27FC236}">
+                <a16:creationId xmlns:a16="http://schemas.microsoft.com/office/drawing/2014/main" id="{36CE696E-F0FD-14A2-A096-ECD514D3D0A6}"/>
+              </a:ext>
+            </a:extLst>
+          </p:cNvPr>
+          <p:cNvPicPr>
+            <a:picLocks noChangeAspect="1" noChangeArrowheads="1"/>
+          </p:cNvPicPr>
+          <p:nvPr/>
+        </p:nvPicPr>
+        <p:blipFill>
+          <a:blip r:embed="rId3">
+            <a:extLst>
+              <a:ext uri="{28A0092B-C50C-407E-A947-70E740481C1C}">
+                <a14:useLocalDpi xmlns:a14="http://schemas.microsoft.com/office/drawing/2010/main" val="0"/>
+              </a:ext>
+            </a:extLst>
+          </a:blip>
+          <a:srcRect/>
+          <a:stretch>
+            <a:fillRect/>
+          </a:stretch>
+        </p:blipFill>
+        <p:spPr bwMode="auto">
+          <a:xfrm>
+            <a:off x="4771729" y="1363384"/>
+            <a:ext cx="943426" cy="943426"/>
+          </a:xfrm>
+          <a:prstGeom prst="rect">
+            <a:avLst/>
+          </a:prstGeom>
+          <a:noFill/>
+          <a:extLst>
+            <a:ext uri="{909E8E84-426E-40DD-AFC4-6F175D3DCCD1}">
+              <a14:hiddenFill xmlns:a14="http://schemas.microsoft.com/office/drawing/2010/main">
+                <a:solidFill>
+                  <a:srgbClr val="FFFFFF"/>
+                </a:solidFill>
+              </a14:hiddenFill>
+            </a:ext>
+          </a:extLst>
+        </p:spPr>
+      </p:pic>
+      <p:pic>
+        <p:nvPicPr>
+          <p:cNvPr id="17" name="Picture 6" descr="Folder Dossier Temps SZ icon">
+            <a:extLst>
+              <a:ext uri="{FF2B5EF4-FFF2-40B4-BE49-F238E27FC236}">
+                <a16:creationId xmlns:a16="http://schemas.microsoft.com/office/drawing/2014/main" id="{4EC4F55D-8CA7-EC18-4034-F386E5935A29}"/>
+              </a:ext>
+            </a:extLst>
+          </p:cNvPr>
+          <p:cNvPicPr>
+            <a:picLocks noChangeAspect="1" noChangeArrowheads="1"/>
+          </p:cNvPicPr>
+          <p:nvPr/>
+        </p:nvPicPr>
+        <p:blipFill>
+          <a:blip r:embed="rId4">
+            <a:extLst>
+              <a:ext uri="{28A0092B-C50C-407E-A947-70E740481C1C}">
+                <a14:useLocalDpi xmlns:a14="http://schemas.microsoft.com/office/drawing/2010/main" val="0"/>
+              </a:ext>
+            </a:extLst>
+          </a:blip>
+          <a:srcRect/>
+          <a:stretch>
+            <a:fillRect/>
+          </a:stretch>
+        </p:blipFill>
+        <p:spPr bwMode="auto">
+          <a:xfrm>
+            <a:off x="7049970" y="1300645"/>
+            <a:ext cx="1084882" cy="1084882"/>
+          </a:xfrm>
+          <a:prstGeom prst="rect">
+            <a:avLst/>
+          </a:prstGeom>
+          <a:noFill/>
+          <a:extLst>
+            <a:ext uri="{909E8E84-426E-40DD-AFC4-6F175D3DCCD1}">
+              <a14:hiddenFill xmlns:a14="http://schemas.microsoft.com/office/drawing/2010/main">
+                <a:solidFill>
+                  <a:srgbClr val="FFFFFF"/>
+                </a:solidFill>
+              </a14:hiddenFill>
+            </a:ext>
+          </a:extLst>
+        </p:spPr>
+      </p:pic>
+      <p:sp>
+        <p:nvSpPr>
+          <p:cNvPr id="18" name="TextBox 17">
+            <a:extLst>
+              <a:ext uri="{FF2B5EF4-FFF2-40B4-BE49-F238E27FC236}">
+                <a16:creationId xmlns:a16="http://schemas.microsoft.com/office/drawing/2014/main" id="{9438B1B4-1AAC-6763-8BD0-2B8C5BF0E56F}"/>
+              </a:ext>
+            </a:extLst>
+          </p:cNvPr>
+          <p:cNvSpPr txBox="1"/>
+          <p:nvPr/>
+        </p:nvSpPr>
+        <p:spPr>
+          <a:xfrm>
+            <a:off x="1312516" y="2499210"/>
+            <a:ext cx="10346635" cy="369332"/>
+          </a:xfrm>
+          <a:prstGeom prst="rect">
+            <a:avLst/>
+          </a:prstGeom>
+          <a:noFill/>
+        </p:spPr>
+        <p:txBody>
+          <a:bodyPr wrap="square" rtlCol="0">
+            <a:spAutoFit/>
+          </a:bodyPr>
+          <a:lstStyle/>
+          <a:p>
+            <a:r>
+              <a:rPr lang="en-US" dirty="0"/>
+              <a:t>     CMIS		JSON		Folder		Temporary folder	 Camunda 8 Doc          URL</a:t>
+            </a:r>
+          </a:p>
+        </p:txBody>
+      </p:sp>
+      <p:pic>
+        <p:nvPicPr>
+          <p:cNvPr id="19" name="Picture 18">
+            <a:extLst>
+              <a:ext uri="{FF2B5EF4-FFF2-40B4-BE49-F238E27FC236}">
+                <a16:creationId xmlns:a16="http://schemas.microsoft.com/office/drawing/2014/main" id="{22F1579F-DA98-070D-92B9-C2F37FA6E68A}"/>
+              </a:ext>
+            </a:extLst>
+          </p:cNvPr>
+          <p:cNvPicPr>
+            <a:picLocks noChangeAspect="1"/>
+          </p:cNvPicPr>
+          <p:nvPr/>
+        </p:nvPicPr>
+        <p:blipFill>
+          <a:blip r:embed="rId5"/>
+          <a:stretch>
+            <a:fillRect/>
+          </a:stretch>
+        </p:blipFill>
+        <p:spPr>
+          <a:xfrm>
+            <a:off x="8726692" y="1702414"/>
+            <a:ext cx="1018095" cy="342725"/>
+          </a:xfrm>
+          <a:prstGeom prst="rect">
+            <a:avLst/>
+          </a:prstGeom>
+        </p:spPr>
+      </p:pic>
+      <p:sp>
+        <p:nvSpPr>
+          <p:cNvPr id="21" name="TextBox 20">
+            <a:extLst>
+              <a:ext uri="{FF2B5EF4-FFF2-40B4-BE49-F238E27FC236}">
+                <a16:creationId xmlns:a16="http://schemas.microsoft.com/office/drawing/2014/main" id="{7BC76472-FE50-CB82-20A5-568A4A0A33D0}"/>
+              </a:ext>
+            </a:extLst>
+          </p:cNvPr>
+          <p:cNvSpPr txBox="1"/>
+          <p:nvPr/>
+        </p:nvSpPr>
+        <p:spPr>
+          <a:xfrm>
+            <a:off x="49971" y="3605485"/>
+            <a:ext cx="2199000" cy="646331"/>
+          </a:xfrm>
+          <a:prstGeom prst="rect">
+            <a:avLst/>
+          </a:prstGeom>
+          <a:noFill/>
+        </p:spPr>
+        <p:txBody>
+          <a:bodyPr wrap="none" rtlCol="0">
+            <a:spAutoFit/>
+          </a:bodyPr>
+          <a:lstStyle/>
+          <a:p>
+            <a:r>
+              <a:rPr lang="en-US" dirty="0"/>
+              <a:t>Source File Reference</a:t>
+            </a:r>
+          </a:p>
+          <a:p>
+            <a:r>
+              <a:rPr lang="en-US" dirty="0"/>
+              <a:t>Storage definition</a:t>
+            </a:r>
+          </a:p>
+        </p:txBody>
+      </p:sp>
+    </p:spTree>
+    <p:extLst>
+      <p:ext uri="{BB962C8B-B14F-4D97-AF65-F5344CB8AC3E}">
+        <p14:creationId xmlns:p14="http://schemas.microsoft.com/office/powerpoint/2010/main" val="805668926"/>
       </p:ext>
     </p:extLst>
   </p:cSld>

</xml_diff>